<commit_message>
Modificata presentazione, completati graficiAlinee
</commit_message>
<xml_diff>
--- a/Steam.pptx
+++ b/Steam.pptx
@@ -283,7 +283,7 @@
           <a:p>
             <a:fld id="{6014689B-0DCE-4194-8205-09B15DFDD564}" type="datetimeFigureOut">
               <a:rPr lang="en-US" smtClean="0"/>
-              <a:t>6/30/2023</a:t>
+              <a:t>7/2/2023</a:t>
             </a:fld>
             <a:endParaRPr lang="en-US"/>
           </a:p>
@@ -483,7 +483,7 @@
           <a:p>
             <a:fld id="{6014689B-0DCE-4194-8205-09B15DFDD564}" type="datetimeFigureOut">
               <a:rPr lang="en-US" smtClean="0"/>
-              <a:t>6/30/2023</a:t>
+              <a:t>7/2/2023</a:t>
             </a:fld>
             <a:endParaRPr lang="en-US"/>
           </a:p>
@@ -693,7 +693,7 @@
           <a:p>
             <a:fld id="{6014689B-0DCE-4194-8205-09B15DFDD564}" type="datetimeFigureOut">
               <a:rPr lang="en-US" smtClean="0"/>
-              <a:t>6/30/2023</a:t>
+              <a:t>7/2/2023</a:t>
             </a:fld>
             <a:endParaRPr lang="en-US"/>
           </a:p>
@@ -893,7 +893,7 @@
           <a:p>
             <a:fld id="{6014689B-0DCE-4194-8205-09B15DFDD564}" type="datetimeFigureOut">
               <a:rPr lang="en-US" smtClean="0"/>
-              <a:t>6/30/2023</a:t>
+              <a:t>7/2/2023</a:t>
             </a:fld>
             <a:endParaRPr lang="en-US"/>
           </a:p>
@@ -1169,7 +1169,7 @@
           <a:p>
             <a:fld id="{6014689B-0DCE-4194-8205-09B15DFDD564}" type="datetimeFigureOut">
               <a:rPr lang="en-US" smtClean="0"/>
-              <a:t>6/30/2023</a:t>
+              <a:t>7/2/2023</a:t>
             </a:fld>
             <a:endParaRPr lang="en-US"/>
           </a:p>
@@ -1437,7 +1437,7 @@
           <a:p>
             <a:fld id="{6014689B-0DCE-4194-8205-09B15DFDD564}" type="datetimeFigureOut">
               <a:rPr lang="en-US" smtClean="0"/>
-              <a:t>6/30/2023</a:t>
+              <a:t>7/2/2023</a:t>
             </a:fld>
             <a:endParaRPr lang="en-US"/>
           </a:p>
@@ -1852,7 +1852,7 @@
           <a:p>
             <a:fld id="{6014689B-0DCE-4194-8205-09B15DFDD564}" type="datetimeFigureOut">
               <a:rPr lang="en-US" smtClean="0"/>
-              <a:t>6/30/2023</a:t>
+              <a:t>7/2/2023</a:t>
             </a:fld>
             <a:endParaRPr lang="en-US"/>
           </a:p>
@@ -1994,7 +1994,7 @@
           <a:p>
             <a:fld id="{6014689B-0DCE-4194-8205-09B15DFDD564}" type="datetimeFigureOut">
               <a:rPr lang="en-US" smtClean="0"/>
-              <a:t>6/30/2023</a:t>
+              <a:t>7/2/2023</a:t>
             </a:fld>
             <a:endParaRPr lang="en-US"/>
           </a:p>
@@ -2107,7 +2107,7 @@
           <a:p>
             <a:fld id="{6014689B-0DCE-4194-8205-09B15DFDD564}" type="datetimeFigureOut">
               <a:rPr lang="en-US" smtClean="0"/>
-              <a:t>6/30/2023</a:t>
+              <a:t>7/2/2023</a:t>
             </a:fld>
             <a:endParaRPr lang="en-US"/>
           </a:p>
@@ -2420,7 +2420,7 @@
           <a:p>
             <a:fld id="{6014689B-0DCE-4194-8205-09B15DFDD564}" type="datetimeFigureOut">
               <a:rPr lang="en-US" smtClean="0"/>
-              <a:t>6/30/2023</a:t>
+              <a:t>7/2/2023</a:t>
             </a:fld>
             <a:endParaRPr lang="en-US"/>
           </a:p>
@@ -2709,7 +2709,7 @@
           <a:p>
             <a:fld id="{6014689B-0DCE-4194-8205-09B15DFDD564}" type="datetimeFigureOut">
               <a:rPr lang="en-US" smtClean="0"/>
-              <a:t>6/30/2023</a:t>
+              <a:t>7/2/2023</a:t>
             </a:fld>
             <a:endParaRPr lang="en-US"/>
           </a:p>
@@ -2952,7 +2952,7 @@
           <a:p>
             <a:fld id="{6014689B-0DCE-4194-8205-09B15DFDD564}" type="datetimeFigureOut">
               <a:rPr lang="en-US" smtClean="0"/>
-              <a:t>6/30/2023</a:t>
+              <a:t>7/2/2023</a:t>
             </a:fld>
             <a:endParaRPr lang="en-US"/>
           </a:p>
@@ -4719,7 +4719,23 @@
                   <a:srgbClr val="66C0F4"/>
                 </a:solidFill>
               </a:rPr>
-              <a:t>Free2Play(f2p) vs Pay2Play(p2p)</a:t>
+              <a:t>Free2Play(f2p) vs Pay2Play(p2p) (</a:t>
+            </a:r>
+            <a:r>
+              <a:rPr lang="en-US" sz="3200" b="1" dirty="0" err="1">
+                <a:solidFill>
+                  <a:srgbClr val="66C0F4"/>
+                </a:solidFill>
+              </a:rPr>
+              <a:t>e_u</a:t>
+            </a:r>
+            <a:r>
+              <a:rPr lang="en-US" sz="3200" b="1" dirty="0">
+                <a:solidFill>
+                  <a:srgbClr val="66C0F4"/>
+                </a:solidFill>
+              </a:rPr>
+              <a:t>)</a:t>
             </a:r>
           </a:p>
         </p:txBody>
@@ -5935,11 +5951,46 @@
           <a:lstStyle/>
           <a:p>
             <a:pPr algn="ctr"/>
-            <a:endParaRPr lang="en-US" sz="3200" b="1" dirty="0">
-              <a:solidFill>
-                <a:srgbClr val="66C0F4"/>
-              </a:solidFill>
-            </a:endParaRPr>
+            <a:r>
+              <a:rPr lang="en-US" sz="3200" b="1" dirty="0">
+                <a:solidFill>
+                  <a:srgbClr val="66C0F4"/>
+                </a:solidFill>
+              </a:rPr>
+              <a:t>Free2Play(f2p) vs Pay2Play(p2p) (</a:t>
+            </a:r>
+            <a:r>
+              <a:rPr lang="en-US" sz="3200" b="1" dirty="0" err="1">
+                <a:solidFill>
+                  <a:srgbClr val="66C0F4"/>
+                </a:solidFill>
+              </a:rPr>
+              <a:t>e_u</a:t>
+            </a:r>
+            <a:r>
+              <a:rPr lang="en-US" sz="3200" b="1" dirty="0">
+                <a:solidFill>
+                  <a:srgbClr val="66C0F4"/>
+                </a:solidFill>
+              </a:rPr>
+              <a:t>*</a:t>
+            </a:r>
+            <a:r>
+              <a:rPr lang="en-US" sz="3200" b="1" dirty="0" err="1">
+                <a:solidFill>
+                  <a:srgbClr val="66C0F4"/>
+                </a:solidFill>
+              </a:rPr>
+              <a:t>Avg_time</a:t>
+            </a:r>
+            <a:r>
+              <a:rPr lang="en-US" sz="3200" b="1" dirty="0">
+                <a:solidFill>
+                  <a:srgbClr val="66C0F4"/>
+                </a:solidFill>
+              </a:rPr>
+              <a:t>)</a:t>
+            </a:r>
           </a:p>
         </p:txBody>
       </p:sp>
@@ -6437,7 +6488,7 @@
         </p:nvSpPr>
         <p:spPr>
           <a:xfrm>
-            <a:off x="1494118" y="1452283"/>
+            <a:off x="1699247" y="1859339"/>
             <a:ext cx="5487080" cy="3139321"/>
           </a:xfrm>
           <a:prstGeom prst="rect">
@@ -9613,7 +9664,7 @@
           <a:p>
             <a:pPr algn="ctr"/>
             <a:r>
-              <a:rPr lang="en-US" sz="3200" b="1" dirty="0">
+              <a:rPr lang="en-US" sz="3200" b="1">
                 <a:solidFill>
                   <a:srgbClr val="66C0F4"/>
                 </a:solidFill>
@@ -9621,6 +9672,12 @@
               </a:rPr>
               <a:t>RACCOLTA DATI</a:t>
             </a:r>
+            <a:endParaRPr lang="en-US" sz="3200" b="1" dirty="0">
+              <a:solidFill>
+                <a:srgbClr val="66C0F4"/>
+              </a:solidFill>
+              <a:cs typeface="Arial" panose="020B0604020202020204" pitchFamily="34" charset="0"/>
+            </a:endParaRPr>
           </a:p>
         </p:txBody>
       </p:sp>
@@ -9746,23 +9803,7 @@
                   <a:srgbClr val="66C0F4"/>
                 </a:solidFill>
               </a:rPr>
-              <a:t>I  </a:t>
-            </a:r>
-            <a:r>
-              <a:rPr lang="en-US" sz="3200" b="1" dirty="0" err="1">
-                <a:solidFill>
-                  <a:srgbClr val="66C0F4"/>
-                </a:solidFill>
-              </a:rPr>
-              <a:t>prodotti</a:t>
-            </a:r>
-            <a:r>
-              <a:rPr lang="en-US" sz="3200" b="1" dirty="0">
-                <a:solidFill>
-                  <a:srgbClr val="66C0F4"/>
-                </a:solidFill>
-              </a:rPr>
-              <a:t> di STEAM</a:t>
+              <a:t>I  PRODOTTI DI STEAM</a:t>
             </a:r>
           </a:p>
         </p:txBody>
@@ -10408,68 +10449,12 @@
           <a:p>
             <a:pPr algn="ctr"/>
             <a:r>
-              <a:rPr lang="en-US" sz="3200" b="1" dirty="0" err="1">
-                <a:solidFill>
-                  <a:srgbClr val="66C0F4"/>
-                </a:solidFill>
-              </a:rPr>
-              <a:t>Distribuzione</a:t>
-            </a:r>
-            <a:r>
               <a:rPr lang="en-US" sz="3200" b="1" dirty="0">
                 <a:solidFill>
                   <a:srgbClr val="66C0F4"/>
                 </a:solidFill>
               </a:rPr>
-              <a:t> </a:t>
-            </a:r>
-            <a:r>
-              <a:rPr lang="en-US" sz="3200" b="1" dirty="0" err="1">
-                <a:solidFill>
-                  <a:srgbClr val="66C0F4"/>
-                </a:solidFill>
-              </a:rPr>
-              <a:t>dei</a:t>
-            </a:r>
-            <a:r>
-              <a:rPr lang="en-US" sz="3200" b="1" dirty="0">
-                <a:solidFill>
-                  <a:srgbClr val="66C0F4"/>
-                </a:solidFill>
-              </a:rPr>
-              <a:t> </a:t>
-            </a:r>
-            <a:r>
-              <a:rPr lang="en-US" sz="3200" b="1" dirty="0" err="1">
-                <a:solidFill>
-                  <a:srgbClr val="66C0F4"/>
-                </a:solidFill>
-              </a:rPr>
-              <a:t>rilasci</a:t>
-            </a:r>
-            <a:r>
-              <a:rPr lang="en-US" sz="3200" b="1" dirty="0">
-                <a:solidFill>
-                  <a:srgbClr val="66C0F4"/>
-                </a:solidFill>
-              </a:rPr>
-              <a:t> di VG </a:t>
-            </a:r>
-            <a:r>
-              <a:rPr lang="en-US" sz="3200" b="1" dirty="0" err="1">
-                <a:solidFill>
-                  <a:srgbClr val="66C0F4"/>
-                </a:solidFill>
-              </a:rPr>
-              <a:t>negli</a:t>
-            </a:r>
-            <a:r>
-              <a:rPr lang="en-US" sz="3200" b="1" dirty="0">
-                <a:solidFill>
-                  <a:srgbClr val="66C0F4"/>
-                </a:solidFill>
-              </a:rPr>
-              <a:t> anni</a:t>
+              <a:t>DISTRIBUZIONE DEI RILASCI DI VG NEGLI ANNI</a:t>
             </a:r>
           </a:p>
         </p:txBody>
@@ -10525,10 +10510,10 @@
       </p:pic>
       <p:pic>
         <p:nvPicPr>
-          <p:cNvPr id="4" name="Immagine 3">
-            <a:extLst>
-              <a:ext uri="{FF2B5EF4-FFF2-40B4-BE49-F238E27FC236}">
-                <a16:creationId xmlns:a16="http://schemas.microsoft.com/office/drawing/2014/main" id="{94B253BE-B6DF-618A-B28F-BC65094A7037}"/>
+          <p:cNvPr id="14" name="Immagine 13" descr="Immagine che contiene diagramma, linea, Diagramma, testo&#10;&#10;Descrizione generata automaticamente">
+            <a:extLst>
+              <a:ext uri="{FF2B5EF4-FFF2-40B4-BE49-F238E27FC236}">
+                <a16:creationId xmlns:a16="http://schemas.microsoft.com/office/drawing/2014/main" id="{F3EBADB6-8C08-6A57-6A95-24E5D23F44D5}"/>
               </a:ext>
             </a:extLst>
           </p:cNvPr>
@@ -10538,15 +10523,21 @@
           <p:nvPr/>
         </p:nvPicPr>
         <p:blipFill>
-          <a:blip r:embed="rId3"/>
+          <a:blip r:embed="rId3">
+            <a:extLst>
+              <a:ext uri="{28A0092B-C50C-407E-A947-70E740481C1C}">
+                <a14:useLocalDpi xmlns:a14="http://schemas.microsoft.com/office/drawing/2010/main" val="0"/>
+              </a:ext>
+            </a:extLst>
+          </a:blip>
           <a:stretch>
             <a:fillRect/>
           </a:stretch>
         </p:blipFill>
         <p:spPr>
           <a:xfrm>
-            <a:off x="3658476" y="2025889"/>
-            <a:ext cx="4875048" cy="2479916"/>
+            <a:off x="1738513" y="937577"/>
+            <a:ext cx="8714973" cy="5032076"/>
           </a:xfrm>
           <a:prstGeom prst="rect">
             <a:avLst/>
@@ -10718,36 +10709,6 @@
             <a:reflection endPos="0" dir="5400000" sy="-100000" algn="bl" rotWithShape="0"/>
             <a:softEdge rad="0"/>
           </a:effectLst>
-        </p:spPr>
-      </p:pic>
-      <p:pic>
-        <p:nvPicPr>
-          <p:cNvPr id="4" name="Immagine 3">
-            <a:extLst>
-              <a:ext uri="{FF2B5EF4-FFF2-40B4-BE49-F238E27FC236}">
-                <a16:creationId xmlns:a16="http://schemas.microsoft.com/office/drawing/2014/main" id="{94B253BE-B6DF-618A-B28F-BC65094A7037}"/>
-              </a:ext>
-            </a:extLst>
-          </p:cNvPr>
-          <p:cNvPicPr>
-            <a:picLocks noChangeAspect="1"/>
-          </p:cNvPicPr>
-          <p:nvPr/>
-        </p:nvPicPr>
-        <p:blipFill>
-          <a:blip r:embed="rId3"/>
-          <a:stretch>
-            <a:fillRect/>
-          </a:stretch>
-        </p:blipFill>
-        <p:spPr>
-          <a:xfrm>
-            <a:off x="3658476" y="2345929"/>
-            <a:ext cx="4875048" cy="2479916"/>
-          </a:xfrm>
-          <a:prstGeom prst="rect">
-            <a:avLst/>
-          </a:prstGeom>
         </p:spPr>
       </p:pic>
     </p:spTree>
@@ -11229,23 +11190,7 @@
                   <a:srgbClr val="66C0F4"/>
                 </a:solidFill>
               </a:rPr>
-              <a:t>Potere</a:t>
-            </a:r>
-            <a:r>
-              <a:rPr lang="en-US" sz="3200" b="1" dirty="0">
-                <a:solidFill>
-                  <a:srgbClr val="66C0F4"/>
-                </a:solidFill>
-              </a:rPr>
-              <a:t> </a:t>
-            </a:r>
-            <a:r>
-              <a:rPr lang="en-US" sz="3200" b="1" dirty="0" err="1">
-                <a:solidFill>
-                  <a:srgbClr val="66C0F4"/>
-                </a:solidFill>
-              </a:rPr>
-              <a:t>d’Acquisto</a:t>
+              <a:t>Reddito</a:t>
             </a:r>
             <a:endParaRPr lang="en-US" sz="3200" b="1" dirty="0">
               <a:solidFill>
@@ -11306,10 +11251,10 @@
       </p:pic>
       <p:pic>
         <p:nvPicPr>
-          <p:cNvPr id="8" name="Immagine 7">
-            <a:extLst>
-              <a:ext uri="{FF2B5EF4-FFF2-40B4-BE49-F238E27FC236}">
-                <a16:creationId xmlns:a16="http://schemas.microsoft.com/office/drawing/2014/main" id="{840E4800-5D10-47E9-6DB2-BA37D8A47B21}"/>
+          <p:cNvPr id="3" name="Immagine 2" descr="Immagine che contiene testo, Diagramma, diagramma, linea&#10;&#10;Descrizione generata automaticamente">
+            <a:extLst>
+              <a:ext uri="{FF2B5EF4-FFF2-40B4-BE49-F238E27FC236}">
+                <a16:creationId xmlns:a16="http://schemas.microsoft.com/office/drawing/2014/main" id="{E100DEF4-EAFA-2EEF-22F8-356F9C69829F}"/>
               </a:ext>
             </a:extLst>
           </p:cNvPr>
@@ -11319,15 +11264,21 @@
           <p:nvPr/>
         </p:nvPicPr>
         <p:blipFill>
-          <a:blip r:embed="rId3"/>
+          <a:blip r:embed="rId3">
+            <a:extLst>
+              <a:ext uri="{28A0092B-C50C-407E-A947-70E740481C1C}">
+                <a14:useLocalDpi xmlns:a14="http://schemas.microsoft.com/office/drawing/2010/main" val="0"/>
+              </a:ext>
+            </a:extLst>
+          </a:blip>
           <a:stretch>
             <a:fillRect/>
           </a:stretch>
         </p:blipFill>
         <p:spPr>
           <a:xfrm>
-            <a:off x="4943314" y="2519235"/>
-            <a:ext cx="2305372" cy="1819529"/>
+            <a:off x="1847850" y="976312"/>
+            <a:ext cx="8496300" cy="4905375"/>
           </a:xfrm>
           <a:prstGeom prst="rect">
             <a:avLst/>

</xml_diff>

<commit_message>
Modificato sunburst / piechartsSubplots -- Updated pptx
</commit_message>
<xml_diff>
--- a/Steam.pptx
+++ b/Steam.pptx
@@ -4,6 +4,9 @@
   <p:sldMasterIdLst>
     <p:sldMasterId id="2147483756" r:id="rId1"/>
   </p:sldMasterIdLst>
+  <p:notesMasterIdLst>
+    <p:notesMasterId r:id="rId31"/>
+  </p:notesMasterIdLst>
   <p:sldIdLst>
     <p:sldId id="257" r:id="rId2"/>
     <p:sldId id="259" r:id="rId3"/>
@@ -33,7 +36,7 @@
     <p:sldId id="285" r:id="rId27"/>
     <p:sldId id="281" r:id="rId28"/>
     <p:sldId id="283" r:id="rId29"/>
-    <p:sldId id="282" r:id="rId30"/>
+    <p:sldId id="290" r:id="rId30"/>
   </p:sldIdLst>
   <p:sldSz cx="12192000" cy="6858000"/>
   <p:notesSz cx="6858000" cy="9144000"/>
@@ -138,6 +141,440 @@
     </p:ext>
   </p:extLst>
 </p:presentation>
+</file>
+
+<file path=ppt/notesMasters/notesMaster1.xml><?xml version="1.0" encoding="utf-8"?>
+<p:notesMaster xmlns:a="http://schemas.openxmlformats.org/drawingml/2006/main" xmlns:r="http://schemas.openxmlformats.org/officeDocument/2006/relationships" xmlns:p="http://schemas.openxmlformats.org/presentationml/2006/main">
+  <p:cSld>
+    <p:bg>
+      <p:bgRef idx="1001">
+        <a:schemeClr val="bg1"/>
+      </p:bgRef>
+    </p:bg>
+    <p:spTree>
+      <p:nvGrpSpPr>
+        <p:cNvPr id="1" name=""/>
+        <p:cNvGrpSpPr/>
+        <p:nvPr/>
+      </p:nvGrpSpPr>
+      <p:grpSpPr>
+        <a:xfrm>
+          <a:off x="0" y="0"/>
+          <a:ext cx="0" cy="0"/>
+          <a:chOff x="0" y="0"/>
+          <a:chExt cx="0" cy="0"/>
+        </a:xfrm>
+      </p:grpSpPr>
+      <p:sp>
+        <p:nvSpPr>
+          <p:cNvPr id="2" name="Segnaposto intestazione 1"/>
+          <p:cNvSpPr>
+            <a:spLocks noGrp="1"/>
+          </p:cNvSpPr>
+          <p:nvPr>
+            <p:ph type="hdr" sz="quarter"/>
+          </p:nvPr>
+        </p:nvSpPr>
+        <p:spPr>
+          <a:xfrm>
+            <a:off x="0" y="0"/>
+            <a:ext cx="2971800" cy="458788"/>
+          </a:xfrm>
+          <a:prstGeom prst="rect">
+            <a:avLst/>
+          </a:prstGeom>
+        </p:spPr>
+        <p:txBody>
+          <a:bodyPr vert="horz" lIns="91440" tIns="45720" rIns="91440" bIns="45720" rtlCol="0"/>
+          <a:lstStyle>
+            <a:lvl1pPr algn="l">
+              <a:defRPr sz="1200"/>
+            </a:lvl1pPr>
+          </a:lstStyle>
+          <a:p>
+            <a:endParaRPr lang="en-US"/>
+          </a:p>
+        </p:txBody>
+      </p:sp>
+      <p:sp>
+        <p:nvSpPr>
+          <p:cNvPr id="3" name="Segnaposto data 2"/>
+          <p:cNvSpPr>
+            <a:spLocks noGrp="1"/>
+          </p:cNvSpPr>
+          <p:nvPr>
+            <p:ph type="dt" idx="1"/>
+          </p:nvPr>
+        </p:nvSpPr>
+        <p:spPr>
+          <a:xfrm>
+            <a:off x="3884613" y="0"/>
+            <a:ext cx="2971800" cy="458788"/>
+          </a:xfrm>
+          <a:prstGeom prst="rect">
+            <a:avLst/>
+          </a:prstGeom>
+        </p:spPr>
+        <p:txBody>
+          <a:bodyPr vert="horz" lIns="91440" tIns="45720" rIns="91440" bIns="45720" rtlCol="0"/>
+          <a:lstStyle>
+            <a:lvl1pPr algn="r">
+              <a:defRPr sz="1200"/>
+            </a:lvl1pPr>
+          </a:lstStyle>
+          <a:p>
+            <a:fld id="{7022550D-5032-4B1A-B8F2-136CEE1C1CE7}" type="datetimeFigureOut">
+              <a:rPr lang="en-US" smtClean="0"/>
+              <a:t>7/7/2023</a:t>
+            </a:fld>
+            <a:endParaRPr lang="en-US"/>
+          </a:p>
+        </p:txBody>
+      </p:sp>
+      <p:sp>
+        <p:nvSpPr>
+          <p:cNvPr id="4" name="Segnaposto immagine diapositiva 3"/>
+          <p:cNvSpPr>
+            <a:spLocks noGrp="1" noRot="1" noChangeAspect="1"/>
+          </p:cNvSpPr>
+          <p:nvPr>
+            <p:ph type="sldImg" idx="2"/>
+          </p:nvPr>
+        </p:nvSpPr>
+        <p:spPr>
+          <a:xfrm>
+            <a:off x="685800" y="1143000"/>
+            <a:ext cx="5486400" cy="3086100"/>
+          </a:xfrm>
+          <a:prstGeom prst="rect">
+            <a:avLst/>
+          </a:prstGeom>
+          <a:noFill/>
+          <a:ln w="12700">
+            <a:solidFill>
+              <a:prstClr val="black"/>
+            </a:solidFill>
+          </a:ln>
+        </p:spPr>
+        <p:txBody>
+          <a:bodyPr vert="horz" lIns="91440" tIns="45720" rIns="91440" bIns="45720" rtlCol="0" anchor="ctr"/>
+          <a:lstStyle/>
+          <a:p>
+            <a:endParaRPr lang="en-US"/>
+          </a:p>
+        </p:txBody>
+      </p:sp>
+      <p:sp>
+        <p:nvSpPr>
+          <p:cNvPr id="5" name="Segnaposto note 4"/>
+          <p:cNvSpPr>
+            <a:spLocks noGrp="1"/>
+          </p:cNvSpPr>
+          <p:nvPr>
+            <p:ph type="body" sz="quarter" idx="3"/>
+          </p:nvPr>
+        </p:nvSpPr>
+        <p:spPr>
+          <a:xfrm>
+            <a:off x="685800" y="4400550"/>
+            <a:ext cx="5486400" cy="3600450"/>
+          </a:xfrm>
+          <a:prstGeom prst="rect">
+            <a:avLst/>
+          </a:prstGeom>
+        </p:spPr>
+        <p:txBody>
+          <a:bodyPr vert="horz" lIns="91440" tIns="45720" rIns="91440" bIns="45720" rtlCol="0"/>
+          <a:lstStyle/>
+          <a:p>
+            <a:pPr lvl="0"/>
+            <a:r>
+              <a:rPr lang="it-IT"/>
+              <a:t>Fare clic per modificare gli stili del testo dello schema</a:t>
+            </a:r>
+          </a:p>
+          <a:p>
+            <a:pPr lvl="1"/>
+            <a:r>
+              <a:rPr lang="it-IT"/>
+              <a:t>Secondo livello</a:t>
+            </a:r>
+          </a:p>
+          <a:p>
+            <a:pPr lvl="2"/>
+            <a:r>
+              <a:rPr lang="it-IT"/>
+              <a:t>Terzo livello</a:t>
+            </a:r>
+          </a:p>
+          <a:p>
+            <a:pPr lvl="3"/>
+            <a:r>
+              <a:rPr lang="it-IT"/>
+              <a:t>Quarto livello</a:t>
+            </a:r>
+          </a:p>
+          <a:p>
+            <a:pPr lvl="4"/>
+            <a:r>
+              <a:rPr lang="it-IT"/>
+              <a:t>Quinto livello</a:t>
+            </a:r>
+            <a:endParaRPr lang="en-US"/>
+          </a:p>
+        </p:txBody>
+      </p:sp>
+      <p:sp>
+        <p:nvSpPr>
+          <p:cNvPr id="6" name="Segnaposto piè di pagina 5"/>
+          <p:cNvSpPr>
+            <a:spLocks noGrp="1"/>
+          </p:cNvSpPr>
+          <p:nvPr>
+            <p:ph type="ftr" sz="quarter" idx="4"/>
+          </p:nvPr>
+        </p:nvSpPr>
+        <p:spPr>
+          <a:xfrm>
+            <a:off x="0" y="8685213"/>
+            <a:ext cx="2971800" cy="458787"/>
+          </a:xfrm>
+          <a:prstGeom prst="rect">
+            <a:avLst/>
+          </a:prstGeom>
+        </p:spPr>
+        <p:txBody>
+          <a:bodyPr vert="horz" lIns="91440" tIns="45720" rIns="91440" bIns="45720" rtlCol="0" anchor="b"/>
+          <a:lstStyle>
+            <a:lvl1pPr algn="l">
+              <a:defRPr sz="1200"/>
+            </a:lvl1pPr>
+          </a:lstStyle>
+          <a:p>
+            <a:endParaRPr lang="en-US"/>
+          </a:p>
+        </p:txBody>
+      </p:sp>
+      <p:sp>
+        <p:nvSpPr>
+          <p:cNvPr id="7" name="Segnaposto numero diapositiva 6"/>
+          <p:cNvSpPr>
+            <a:spLocks noGrp="1"/>
+          </p:cNvSpPr>
+          <p:nvPr>
+            <p:ph type="sldNum" sz="quarter" idx="5"/>
+          </p:nvPr>
+        </p:nvSpPr>
+        <p:spPr>
+          <a:xfrm>
+            <a:off x="3884613" y="8685213"/>
+            <a:ext cx="2971800" cy="458787"/>
+          </a:xfrm>
+          <a:prstGeom prst="rect">
+            <a:avLst/>
+          </a:prstGeom>
+        </p:spPr>
+        <p:txBody>
+          <a:bodyPr vert="horz" lIns="91440" tIns="45720" rIns="91440" bIns="45720" rtlCol="0" anchor="b"/>
+          <a:lstStyle>
+            <a:lvl1pPr algn="r">
+              <a:defRPr sz="1200"/>
+            </a:lvl1pPr>
+          </a:lstStyle>
+          <a:p>
+            <a:fld id="{A7553FA8-B7AE-4ACD-B9E8-7BB9AFC836CD}" type="slidenum">
+              <a:rPr lang="en-US" smtClean="0"/>
+              <a:t>‹N›</a:t>
+            </a:fld>
+            <a:endParaRPr lang="en-US"/>
+          </a:p>
+        </p:txBody>
+      </p:sp>
+    </p:spTree>
+    <p:extLst>
+      <p:ext uri="{BB962C8B-B14F-4D97-AF65-F5344CB8AC3E}">
+        <p14:creationId xmlns:p14="http://schemas.microsoft.com/office/powerpoint/2010/main" val="2416341102"/>
+      </p:ext>
+    </p:extLst>
+  </p:cSld>
+  <p:clrMap bg1="lt1" tx1="dk1" bg2="lt2" tx2="dk2" accent1="accent1" accent2="accent2" accent3="accent3" accent4="accent4" accent5="accent5" accent6="accent6" hlink="hlink" folHlink="folHlink"/>
+  <p:notesStyle>
+    <a:lvl1pPr marL="0" algn="l" defTabSz="914400" rtl="0" eaLnBrk="1" latinLnBrk="0" hangingPunct="1">
+      <a:defRPr sz="1200" kern="1200">
+        <a:solidFill>
+          <a:schemeClr val="tx1"/>
+        </a:solidFill>
+        <a:latin typeface="+mn-lt"/>
+        <a:ea typeface="+mn-ea"/>
+        <a:cs typeface="+mn-cs"/>
+      </a:defRPr>
+    </a:lvl1pPr>
+    <a:lvl2pPr marL="457200" algn="l" defTabSz="914400" rtl="0" eaLnBrk="1" latinLnBrk="0" hangingPunct="1">
+      <a:defRPr sz="1200" kern="1200">
+        <a:solidFill>
+          <a:schemeClr val="tx1"/>
+        </a:solidFill>
+        <a:latin typeface="+mn-lt"/>
+        <a:ea typeface="+mn-ea"/>
+        <a:cs typeface="+mn-cs"/>
+      </a:defRPr>
+    </a:lvl2pPr>
+    <a:lvl3pPr marL="914400" algn="l" defTabSz="914400" rtl="0" eaLnBrk="1" latinLnBrk="0" hangingPunct="1">
+      <a:defRPr sz="1200" kern="1200">
+        <a:solidFill>
+          <a:schemeClr val="tx1"/>
+        </a:solidFill>
+        <a:latin typeface="+mn-lt"/>
+        <a:ea typeface="+mn-ea"/>
+        <a:cs typeface="+mn-cs"/>
+      </a:defRPr>
+    </a:lvl3pPr>
+    <a:lvl4pPr marL="1371600" algn="l" defTabSz="914400" rtl="0" eaLnBrk="1" latinLnBrk="0" hangingPunct="1">
+      <a:defRPr sz="1200" kern="1200">
+        <a:solidFill>
+          <a:schemeClr val="tx1"/>
+        </a:solidFill>
+        <a:latin typeface="+mn-lt"/>
+        <a:ea typeface="+mn-ea"/>
+        <a:cs typeface="+mn-cs"/>
+      </a:defRPr>
+    </a:lvl4pPr>
+    <a:lvl5pPr marL="1828800" algn="l" defTabSz="914400" rtl="0" eaLnBrk="1" latinLnBrk="0" hangingPunct="1">
+      <a:defRPr sz="1200" kern="1200">
+        <a:solidFill>
+          <a:schemeClr val="tx1"/>
+        </a:solidFill>
+        <a:latin typeface="+mn-lt"/>
+        <a:ea typeface="+mn-ea"/>
+        <a:cs typeface="+mn-cs"/>
+      </a:defRPr>
+    </a:lvl5pPr>
+    <a:lvl6pPr marL="2286000" algn="l" defTabSz="914400" rtl="0" eaLnBrk="1" latinLnBrk="0" hangingPunct="1">
+      <a:defRPr sz="1200" kern="1200">
+        <a:solidFill>
+          <a:schemeClr val="tx1"/>
+        </a:solidFill>
+        <a:latin typeface="+mn-lt"/>
+        <a:ea typeface="+mn-ea"/>
+        <a:cs typeface="+mn-cs"/>
+      </a:defRPr>
+    </a:lvl6pPr>
+    <a:lvl7pPr marL="2743200" algn="l" defTabSz="914400" rtl="0" eaLnBrk="1" latinLnBrk="0" hangingPunct="1">
+      <a:defRPr sz="1200" kern="1200">
+        <a:solidFill>
+          <a:schemeClr val="tx1"/>
+        </a:solidFill>
+        <a:latin typeface="+mn-lt"/>
+        <a:ea typeface="+mn-ea"/>
+        <a:cs typeface="+mn-cs"/>
+      </a:defRPr>
+    </a:lvl7pPr>
+    <a:lvl8pPr marL="3200400" algn="l" defTabSz="914400" rtl="0" eaLnBrk="1" latinLnBrk="0" hangingPunct="1">
+      <a:defRPr sz="1200" kern="1200">
+        <a:solidFill>
+          <a:schemeClr val="tx1"/>
+        </a:solidFill>
+        <a:latin typeface="+mn-lt"/>
+        <a:ea typeface="+mn-ea"/>
+        <a:cs typeface="+mn-cs"/>
+      </a:defRPr>
+    </a:lvl8pPr>
+    <a:lvl9pPr marL="3657600" algn="l" defTabSz="914400" rtl="0" eaLnBrk="1" latinLnBrk="0" hangingPunct="1">
+      <a:defRPr sz="1200" kern="1200">
+        <a:solidFill>
+          <a:schemeClr val="tx1"/>
+        </a:solidFill>
+        <a:latin typeface="+mn-lt"/>
+        <a:ea typeface="+mn-ea"/>
+        <a:cs typeface="+mn-cs"/>
+      </a:defRPr>
+    </a:lvl9pPr>
+  </p:notesStyle>
+</p:notesMaster>
+</file>
+
+<file path=ppt/notesSlides/notesSlide1.xml><?xml version="1.0" encoding="utf-8"?>
+<p:notes xmlns:a="http://schemas.openxmlformats.org/drawingml/2006/main" xmlns:r="http://schemas.openxmlformats.org/officeDocument/2006/relationships" xmlns:p="http://schemas.openxmlformats.org/presentationml/2006/main">
+  <p:cSld>
+    <p:spTree>
+      <p:nvGrpSpPr>
+        <p:cNvPr id="1" name=""/>
+        <p:cNvGrpSpPr/>
+        <p:nvPr/>
+      </p:nvGrpSpPr>
+      <p:grpSpPr>
+        <a:xfrm>
+          <a:off x="0" y="0"/>
+          <a:ext cx="0" cy="0"/>
+          <a:chOff x="0" y="0"/>
+          <a:chExt cx="0" cy="0"/>
+        </a:xfrm>
+      </p:grpSpPr>
+      <p:sp>
+        <p:nvSpPr>
+          <p:cNvPr id="2" name="Segnaposto immagine diapositiva 1"/>
+          <p:cNvSpPr>
+            <a:spLocks noGrp="1" noRot="1" noChangeAspect="1"/>
+          </p:cNvSpPr>
+          <p:nvPr>
+            <p:ph type="sldImg"/>
+          </p:nvPr>
+        </p:nvSpPr>
+        <p:spPr/>
+      </p:sp>
+      <p:sp>
+        <p:nvSpPr>
+          <p:cNvPr id="3" name="Segnaposto note 2"/>
+          <p:cNvSpPr>
+            <a:spLocks noGrp="1"/>
+          </p:cNvSpPr>
+          <p:nvPr>
+            <p:ph type="body" idx="1"/>
+          </p:nvPr>
+        </p:nvSpPr>
+        <p:spPr/>
+        <p:txBody>
+          <a:bodyPr/>
+          <a:lstStyle/>
+          <a:p>
+            <a:endParaRPr lang="en-US"/>
+          </a:p>
+        </p:txBody>
+      </p:sp>
+      <p:sp>
+        <p:nvSpPr>
+          <p:cNvPr id="4" name="Segnaposto numero diapositiva 3"/>
+          <p:cNvSpPr>
+            <a:spLocks noGrp="1"/>
+          </p:cNvSpPr>
+          <p:nvPr>
+            <p:ph type="sldNum" sz="quarter" idx="5"/>
+          </p:nvPr>
+        </p:nvSpPr>
+        <p:spPr/>
+        <p:txBody>
+          <a:bodyPr/>
+          <a:lstStyle/>
+          <a:p>
+            <a:fld id="{A7553FA8-B7AE-4ACD-B9E8-7BB9AFC836CD}" type="slidenum">
+              <a:rPr lang="en-US" smtClean="0"/>
+              <a:t>29</a:t>
+            </a:fld>
+            <a:endParaRPr lang="en-US"/>
+          </a:p>
+        </p:txBody>
+      </p:sp>
+    </p:spTree>
+    <p:extLst>
+      <p:ext uri="{BB962C8B-B14F-4D97-AF65-F5344CB8AC3E}">
+        <p14:creationId xmlns:p14="http://schemas.microsoft.com/office/powerpoint/2010/main" val="3761193069"/>
+      </p:ext>
+    </p:extLst>
+  </p:cSld>
+  <p:clrMapOvr>
+    <a:masterClrMapping/>
+  </p:clrMapOvr>
+</p:notes>
 </file>
 
 <file path=ppt/slideLayouts/slideLayout1.xml><?xml version="1.0" encoding="utf-8"?>
@@ -3133,7 +3570,7 @@
         <p:spPr>
           <a:xfrm>
             <a:off x="419100" y="1459502"/>
-            <a:ext cx="5658793" cy="1877437"/>
+            <a:ext cx="5676900" cy="1877437"/>
           </a:xfrm>
           <a:prstGeom prst="rect">
             <a:avLst/>
@@ -3141,57 +3578,135 @@
           <a:noFill/>
         </p:spPr>
         <p:txBody>
-          <a:bodyPr wrap="none" rtlCol="0">
+          <a:bodyPr wrap="square" rtlCol="0">
             <a:spAutoFit/>
           </a:bodyPr>
           <a:lstStyle/>
           <a:p>
             <a:r>
-              <a:rPr lang="en-US" sz="2800">
+              <a:rPr lang="en-US" sz="2800" dirty="0" err="1">
                 <a:solidFill>
                   <a:srgbClr val="C7D5E0"/>
                 </a:solidFill>
                 <a:latin typeface="+mj-lt"/>
                 <a:cs typeface="Arial" panose="020B0604020202020204" pitchFamily="34" charset="0"/>
               </a:rPr>
-              <a:t>Analysis of </a:t>
-            </a:r>
-            <a:r>
-              <a:rPr lang="en-US" sz="2800">
-                <a:solidFill>
-                  <a:srgbClr val="66C0F4"/>
+              <a:t>Analisi</a:t>
+            </a:r>
+            <a:r>
+              <a:rPr lang="en-US" sz="2800" dirty="0">
+                <a:solidFill>
+                  <a:srgbClr val="C7D5E0"/>
                 </a:solidFill>
                 <a:latin typeface="+mj-lt"/>
                 <a:cs typeface="Arial" panose="020B0604020202020204" pitchFamily="34" charset="0"/>
               </a:rPr>
-              <a:t>VALVE</a:t>
-            </a:r>
-            <a:r>
-              <a:rPr lang="en-US" sz="2800">
+              <a:t> </a:t>
+            </a:r>
+            <a:r>
+              <a:rPr lang="en-US" sz="2800" dirty="0" err="1">
                 <a:solidFill>
                   <a:srgbClr val="C7D5E0"/>
                 </a:solidFill>
                 <a:latin typeface="+mj-lt"/>
                 <a:cs typeface="Arial" panose="020B0604020202020204" pitchFamily="34" charset="0"/>
               </a:rPr>
-              <a:t>’s digital distribution </a:t>
-            </a:r>
-          </a:p>
-          <a:p>
-            <a:r>
-              <a:rPr lang="en-US" sz="2800">
+              <a:t>della</a:t>
+            </a:r>
+            <a:r>
+              <a:rPr lang="en-US" sz="2800" dirty="0">
                 <a:solidFill>
                   <a:srgbClr val="C7D5E0"/>
                 </a:solidFill>
                 <a:latin typeface="+mj-lt"/>
                 <a:cs typeface="Arial" panose="020B0604020202020204" pitchFamily="34" charset="0"/>
               </a:rPr>
-              <a:t>Service and storefront:</a:t>
-            </a:r>
-          </a:p>
-          <a:p>
-            <a:r>
-              <a:rPr lang="en-US" sz="6000" b="1">
+              <a:t> </a:t>
+            </a:r>
+            <a:r>
+              <a:rPr lang="en-US" sz="2800" dirty="0" err="1">
+                <a:solidFill>
+                  <a:srgbClr val="C7D5E0"/>
+                </a:solidFill>
+                <a:latin typeface="+mj-lt"/>
+                <a:cs typeface="Arial" panose="020B0604020202020204" pitchFamily="34" charset="0"/>
+              </a:rPr>
+              <a:t>piattaforma</a:t>
+            </a:r>
+            <a:r>
+              <a:rPr lang="en-US" sz="2800" dirty="0">
+                <a:solidFill>
+                  <a:srgbClr val="C7D5E0"/>
+                </a:solidFill>
+                <a:latin typeface="+mj-lt"/>
+                <a:cs typeface="Arial" panose="020B0604020202020204" pitchFamily="34" charset="0"/>
+              </a:rPr>
+              <a:t> di </a:t>
+            </a:r>
+            <a:r>
+              <a:rPr lang="en-US" sz="2800" dirty="0" err="1">
+                <a:solidFill>
+                  <a:srgbClr val="C7D5E0"/>
+                </a:solidFill>
+                <a:latin typeface="+mj-lt"/>
+                <a:cs typeface="Arial" panose="020B0604020202020204" pitchFamily="34" charset="0"/>
+              </a:rPr>
+              <a:t>distribuzione</a:t>
+            </a:r>
+            <a:r>
+              <a:rPr lang="en-US" sz="2800" dirty="0">
+                <a:solidFill>
+                  <a:srgbClr val="C7D5E0"/>
+                </a:solidFill>
+                <a:latin typeface="+mj-lt"/>
+                <a:cs typeface="Arial" panose="020B0604020202020204" pitchFamily="34" charset="0"/>
+              </a:rPr>
+              <a:t> </a:t>
+            </a:r>
+            <a:r>
+              <a:rPr lang="en-US" sz="2800" dirty="0" err="1">
+                <a:solidFill>
+                  <a:srgbClr val="C7D5E0"/>
+                </a:solidFill>
+                <a:latin typeface="+mj-lt"/>
+                <a:cs typeface="Arial" panose="020B0604020202020204" pitchFamily="34" charset="0"/>
+              </a:rPr>
+              <a:t>digitale</a:t>
+            </a:r>
+            <a:r>
+              <a:rPr lang="en-US" sz="2800" dirty="0">
+                <a:solidFill>
+                  <a:srgbClr val="C7D5E0"/>
+                </a:solidFill>
+                <a:latin typeface="+mj-lt"/>
+                <a:cs typeface="Arial" panose="020B0604020202020204" pitchFamily="34" charset="0"/>
+              </a:rPr>
+              <a:t> di </a:t>
+            </a:r>
+            <a:r>
+              <a:rPr lang="en-US" sz="2800" dirty="0">
+                <a:solidFill>
+                  <a:srgbClr val="66C0F4"/>
+                </a:solidFill>
+                <a:latin typeface="+mj-lt"/>
+                <a:cs typeface="Arial" panose="020B0604020202020204" pitchFamily="34" charset="0"/>
+              </a:rPr>
+              <a:t>VALVE</a:t>
+            </a:r>
+            <a:r>
+              <a:rPr lang="en-US" sz="2800" dirty="0">
+                <a:solidFill>
+                  <a:srgbClr val="C7D5E0"/>
+                </a:solidFill>
+                <a:latin typeface="+mj-lt"/>
+                <a:cs typeface="Arial" panose="020B0604020202020204" pitchFamily="34" charset="0"/>
+              </a:rPr>
+              <a:t>:</a:t>
+            </a:r>
+          </a:p>
+          <a:p>
+            <a:r>
+              <a:rPr lang="en-US" sz="6000" b="1" dirty="0">
                 <a:solidFill>
                   <a:srgbClr val="66C0F4"/>
                 </a:solidFill>
@@ -3201,7 +3716,7 @@
               <a:t>S</a:t>
             </a:r>
             <a:r>
-              <a:rPr lang="en-US" sz="2800" b="1">
+              <a:rPr lang="en-US" sz="2800" b="1" dirty="0">
                 <a:solidFill>
                   <a:srgbClr val="66C0F4"/>
                 </a:solidFill>
@@ -3211,7 +3726,7 @@
               <a:t> </a:t>
             </a:r>
             <a:r>
-              <a:rPr lang="en-US" sz="6000" b="1">
+              <a:rPr lang="en-US" sz="6000" b="1" dirty="0">
                 <a:solidFill>
                   <a:srgbClr val="66C0F4"/>
                 </a:solidFill>
@@ -3221,7 +3736,7 @@
               <a:t>T</a:t>
             </a:r>
             <a:r>
-              <a:rPr lang="en-US" sz="2800" b="1">
+              <a:rPr lang="en-US" sz="2800" b="1" dirty="0">
                 <a:solidFill>
                   <a:srgbClr val="66C0F4"/>
                 </a:solidFill>
@@ -3231,7 +3746,7 @@
               <a:t> </a:t>
             </a:r>
             <a:r>
-              <a:rPr lang="en-US" sz="6000" b="1">
+              <a:rPr lang="en-US" sz="6000" b="1" dirty="0">
                 <a:solidFill>
                   <a:srgbClr val="66C0F4"/>
                 </a:solidFill>
@@ -3241,7 +3756,7 @@
               <a:t>E</a:t>
             </a:r>
             <a:r>
-              <a:rPr lang="en-US" sz="2800" b="1">
+              <a:rPr lang="en-US" sz="2800" b="1" dirty="0">
                 <a:solidFill>
                   <a:srgbClr val="66C0F4"/>
                 </a:solidFill>
@@ -3251,7 +3766,7 @@
               <a:t> </a:t>
             </a:r>
             <a:r>
-              <a:rPr lang="en-US" sz="6000" b="1">
+              <a:rPr lang="en-US" sz="6000" b="1" dirty="0">
                 <a:solidFill>
                   <a:srgbClr val="66C0F4"/>
                 </a:solidFill>
@@ -3261,7 +3776,7 @@
               <a:t>A</a:t>
             </a:r>
             <a:r>
-              <a:rPr lang="en-US" sz="2800" b="1">
+              <a:rPr lang="en-US" sz="2800" b="1" dirty="0">
                 <a:solidFill>
                   <a:srgbClr val="66C0F4"/>
                 </a:solidFill>
@@ -3271,7 +3786,7 @@
               <a:t> </a:t>
             </a:r>
             <a:r>
-              <a:rPr lang="en-US" sz="6000" b="1">
+              <a:rPr lang="en-US" sz="6000" b="1" dirty="0">
                 <a:solidFill>
                   <a:srgbClr val="66C0F4"/>
                 </a:solidFill>
@@ -3280,13 +3795,34 @@
               </a:rPr>
               <a:t>M</a:t>
             </a:r>
-            <a:endParaRPr lang="en-US" sz="6000" b="1" dirty="0">
-              <a:solidFill>
-                <a:srgbClr val="66C0F4"/>
-              </a:solidFill>
-              <a:latin typeface="Arial" panose="020B0604020202020204" pitchFamily="34" charset="0"/>
-              <a:cs typeface="Arial" panose="020B0604020202020204" pitchFamily="34" charset="0"/>
-            </a:endParaRPr>
+          </a:p>
+        </p:txBody>
+      </p:sp>
+      <p:sp>
+        <p:nvSpPr>
+          <p:cNvPr id="2" name="Titolo 1">
+            <a:extLst>
+              <a:ext uri="{FF2B5EF4-FFF2-40B4-BE49-F238E27FC236}">
+                <a16:creationId xmlns:a16="http://schemas.microsoft.com/office/drawing/2014/main" id="{F6C43D43-162B-4698-E03A-91A1B24E9CA6}"/>
+              </a:ext>
+            </a:extLst>
+          </p:cNvPr>
+          <p:cNvSpPr>
+            <a:spLocks noGrp="1"/>
+          </p:cNvSpPr>
+          <p:nvPr>
+            <p:ph type="title"/>
+          </p:nvPr>
+        </p:nvSpPr>
+        <p:spPr/>
+        <p:txBody>
+          <a:bodyPr/>
+          <a:lstStyle/>
+          <a:p>
+            <a:r>
+              <a:rPr lang="en-US" dirty="0"/>
+              <a:t>Start</a:t>
+            </a:r>
           </a:p>
         </p:txBody>
       </p:sp>
@@ -3624,428 +4160,44 @@
               <a:buNone/>
             </a:pPr>
             <a:r>
-              <a:rPr lang="en-US" sz="2000" dirty="0">
-                <a:solidFill>
-                  <a:srgbClr val="C7D5E0"/>
-                </a:solidFill>
-              </a:rPr>
-              <a:t>Si </a:t>
-            </a:r>
-            <a:r>
-              <a:rPr lang="en-US" sz="2000" dirty="0" err="1">
-                <a:solidFill>
-                  <a:srgbClr val="C7D5E0"/>
-                </a:solidFill>
-              </a:rPr>
-              <a:t>analizza</a:t>
-            </a:r>
-            <a:r>
-              <a:rPr lang="en-US" sz="2000" dirty="0">
-                <a:solidFill>
-                  <a:srgbClr val="C7D5E0"/>
-                </a:solidFill>
-              </a:rPr>
-              <a:t> il </a:t>
-            </a:r>
-            <a:r>
-              <a:rPr lang="en-US" sz="2000" dirty="0" err="1">
-                <a:solidFill>
-                  <a:srgbClr val="C7D5E0"/>
-                </a:solidFill>
-              </a:rPr>
-              <a:t>numero</a:t>
-            </a:r>
-            <a:r>
-              <a:rPr lang="en-US" sz="2000" dirty="0">
-                <a:solidFill>
-                  <a:srgbClr val="C7D5E0"/>
-                </a:solidFill>
-              </a:rPr>
-              <a:t> di </a:t>
-            </a:r>
-            <a:r>
-              <a:rPr lang="en-US" sz="2000" dirty="0" err="1">
-                <a:solidFill>
-                  <a:srgbClr val="66C0F4"/>
-                </a:solidFill>
-              </a:rPr>
-              <a:t>acquisti</a:t>
-            </a:r>
-            <a:r>
-              <a:rPr lang="en-US" sz="2000" dirty="0">
-                <a:solidFill>
-                  <a:srgbClr val="66C0F4"/>
-                </a:solidFill>
-              </a:rPr>
-              <a:t> </a:t>
-            </a:r>
-            <a:r>
-              <a:rPr lang="en-US" sz="2000" dirty="0">
-                <a:solidFill>
-                  <a:srgbClr val="C7D5E0"/>
-                </a:solidFill>
-              </a:rPr>
-              <a:t>di VG per </a:t>
-            </a:r>
-            <a:r>
-              <a:rPr lang="en-US" sz="2000" dirty="0" err="1">
-                <a:solidFill>
-                  <a:srgbClr val="C7D5E0"/>
-                </a:solidFill>
-              </a:rPr>
-              <a:t>ciascuna</a:t>
-            </a:r>
-            <a:r>
-              <a:rPr lang="en-US" sz="2000" dirty="0">
-                <a:solidFill>
-                  <a:srgbClr val="C7D5E0"/>
-                </a:solidFill>
-              </a:rPr>
-              <a:t> </a:t>
-            </a:r>
-            <a:r>
-              <a:rPr lang="en-US" sz="2000" dirty="0" err="1">
-                <a:solidFill>
-                  <a:srgbClr val="C7D5E0"/>
-                </a:solidFill>
-              </a:rPr>
-              <a:t>delle</a:t>
-            </a:r>
-            <a:r>
-              <a:rPr lang="en-US" sz="2000" dirty="0">
-                <a:solidFill>
-                  <a:srgbClr val="C7D5E0"/>
-                </a:solidFill>
-              </a:rPr>
-              <a:t> </a:t>
-            </a:r>
-            <a:r>
-              <a:rPr lang="en-US" sz="2000" dirty="0" err="1">
-                <a:solidFill>
-                  <a:srgbClr val="C7D5E0"/>
-                </a:solidFill>
-              </a:rPr>
-              <a:t>categorie</a:t>
-            </a:r>
-            <a:r>
-              <a:rPr lang="en-US" sz="2000" dirty="0">
-                <a:solidFill>
-                  <a:srgbClr val="C7D5E0"/>
-                </a:solidFill>
-              </a:rPr>
-              <a:t> di </a:t>
-            </a:r>
-            <a:r>
-              <a:rPr lang="en-US" sz="2000" dirty="0" err="1">
-                <a:solidFill>
-                  <a:srgbClr val="66C0F4"/>
-                </a:solidFill>
-              </a:rPr>
-              <a:t>socialita</a:t>
-            </a:r>
-            <a:r>
-              <a:rPr lang="en-US" sz="2000" dirty="0">
-                <a:solidFill>
-                  <a:srgbClr val="66C0F4"/>
-                </a:solidFill>
-              </a:rPr>
-              <a:t>’</a:t>
-            </a:r>
-            <a:r>
-              <a:rPr lang="en-US" sz="2000" dirty="0">
-                <a:solidFill>
-                  <a:srgbClr val="C7D5E0"/>
-                </a:solidFill>
-              </a:rPr>
-              <a:t> del </a:t>
-            </a:r>
-            <a:r>
-              <a:rPr lang="en-US" sz="2000" dirty="0" err="1">
-                <a:solidFill>
-                  <a:srgbClr val="C7D5E0"/>
-                </a:solidFill>
-              </a:rPr>
-              <a:t>prodotto</a:t>
-            </a:r>
-            <a:r>
-              <a:rPr lang="en-US" sz="2000" dirty="0">
-                <a:solidFill>
-                  <a:srgbClr val="C7D5E0"/>
-                </a:solidFill>
-              </a:rPr>
-              <a:t>, </a:t>
-            </a:r>
-            <a:r>
-              <a:rPr lang="en-US" sz="2000" dirty="0" err="1">
-                <a:solidFill>
-                  <a:srgbClr val="C7D5E0"/>
-                </a:solidFill>
-              </a:rPr>
-              <a:t>durante</a:t>
-            </a:r>
-            <a:r>
-              <a:rPr lang="en-US" sz="2000" dirty="0">
-                <a:solidFill>
-                  <a:srgbClr val="C7D5E0"/>
-                </a:solidFill>
-              </a:rPr>
-              <a:t> </a:t>
-            </a:r>
-            <a:r>
-              <a:rPr lang="en-US" sz="2000" dirty="0" err="1">
-                <a:solidFill>
-                  <a:srgbClr val="C7D5E0"/>
-                </a:solidFill>
-              </a:rPr>
-              <a:t>i</a:t>
-            </a:r>
-            <a:r>
-              <a:rPr lang="en-US" sz="2000" dirty="0">
-                <a:solidFill>
-                  <a:srgbClr val="C7D5E0"/>
-                </a:solidFill>
-              </a:rPr>
-              <a:t> </a:t>
-            </a:r>
-            <a:r>
-              <a:rPr lang="en-US" sz="2000" dirty="0" err="1">
-                <a:solidFill>
-                  <a:srgbClr val="C7D5E0"/>
-                </a:solidFill>
-              </a:rPr>
-              <a:t>tre</a:t>
-            </a:r>
-            <a:r>
-              <a:rPr lang="en-US" sz="2000" dirty="0">
-                <a:solidFill>
-                  <a:srgbClr val="C7D5E0"/>
-                </a:solidFill>
-              </a:rPr>
-              <a:t> </a:t>
-            </a:r>
-            <a:r>
-              <a:rPr lang="en-US" sz="2000" dirty="0" err="1">
-                <a:solidFill>
-                  <a:srgbClr val="C7D5E0"/>
-                </a:solidFill>
-              </a:rPr>
-              <a:t>periodi</a:t>
-            </a:r>
-            <a:r>
-              <a:rPr lang="en-US" sz="2000" dirty="0">
-                <a:solidFill>
-                  <a:srgbClr val="C7D5E0"/>
-                </a:solidFill>
-              </a:rPr>
-              <a:t> </a:t>
-            </a:r>
-            <a:r>
-              <a:rPr lang="en-US" sz="2000" dirty="0" err="1">
-                <a:solidFill>
-                  <a:srgbClr val="C7D5E0"/>
-                </a:solidFill>
-              </a:rPr>
-              <a:t>analizzati</a:t>
-            </a:r>
-            <a:r>
-              <a:rPr lang="en-US" sz="2000" dirty="0">
-                <a:solidFill>
-                  <a:srgbClr val="C7D5E0"/>
-                </a:solidFill>
-              </a:rPr>
-              <a:t>, per </a:t>
-            </a:r>
-            <a:r>
-              <a:rPr lang="en-US" sz="2000" dirty="0" err="1">
-                <a:solidFill>
-                  <a:srgbClr val="C7D5E0"/>
-                </a:solidFill>
-              </a:rPr>
-              <a:t>poter</a:t>
-            </a:r>
-            <a:r>
-              <a:rPr lang="en-US" sz="2000" dirty="0">
-                <a:solidFill>
-                  <a:srgbClr val="C7D5E0"/>
-                </a:solidFill>
-              </a:rPr>
-              <a:t> </a:t>
-            </a:r>
-            <a:r>
-              <a:rPr lang="en-US" sz="2000" dirty="0" err="1">
-                <a:solidFill>
-                  <a:srgbClr val="C7D5E0"/>
-                </a:solidFill>
-              </a:rPr>
-              <a:t>mettere</a:t>
-            </a:r>
-            <a:r>
-              <a:rPr lang="en-US" sz="2000" dirty="0">
-                <a:solidFill>
-                  <a:srgbClr val="C7D5E0"/>
-                </a:solidFill>
-              </a:rPr>
-              <a:t> in </a:t>
-            </a:r>
-            <a:r>
-              <a:rPr lang="en-US" sz="2000" dirty="0" err="1">
-                <a:solidFill>
-                  <a:srgbClr val="C7D5E0"/>
-                </a:solidFill>
-              </a:rPr>
-              <a:t>evidenza</a:t>
-            </a:r>
-            <a:r>
-              <a:rPr lang="en-US" sz="2000" dirty="0">
-                <a:solidFill>
-                  <a:srgbClr val="C7D5E0"/>
-                </a:solidFill>
-              </a:rPr>
-              <a:t> </a:t>
-            </a:r>
-            <a:r>
-              <a:rPr lang="en-US" sz="2000" dirty="0" err="1">
-                <a:solidFill>
-                  <a:srgbClr val="C7D5E0"/>
-                </a:solidFill>
-              </a:rPr>
-              <a:t>differenze</a:t>
-            </a:r>
-            <a:r>
-              <a:rPr lang="en-US" sz="2000" dirty="0">
-                <a:solidFill>
-                  <a:srgbClr val="C7D5E0"/>
-                </a:solidFill>
-              </a:rPr>
-              <a:t> </a:t>
-            </a:r>
-            <a:r>
-              <a:rPr lang="en-US" sz="2000" dirty="0" err="1">
-                <a:solidFill>
-                  <a:srgbClr val="C7D5E0"/>
-                </a:solidFill>
-              </a:rPr>
-              <a:t>nelle</a:t>
-            </a:r>
-            <a:r>
-              <a:rPr lang="en-US" sz="2000" dirty="0">
-                <a:solidFill>
-                  <a:srgbClr val="C7D5E0"/>
-                </a:solidFill>
-              </a:rPr>
-              <a:t> </a:t>
-            </a:r>
-            <a:r>
-              <a:rPr lang="en-US" sz="2000" dirty="0" err="1">
-                <a:solidFill>
-                  <a:srgbClr val="C7D5E0"/>
-                </a:solidFill>
-              </a:rPr>
-              <a:t>preferenze</a:t>
-            </a:r>
-            <a:r>
-              <a:rPr lang="en-US" sz="2000" dirty="0">
-                <a:solidFill>
-                  <a:srgbClr val="C7D5E0"/>
-                </a:solidFill>
-              </a:rPr>
-              <a:t> di </a:t>
-            </a:r>
-            <a:r>
-              <a:rPr lang="en-US" sz="2000" dirty="0" err="1">
-                <a:solidFill>
-                  <a:srgbClr val="C7D5E0"/>
-                </a:solidFill>
-              </a:rPr>
-              <a:t>acquisto</a:t>
-            </a:r>
-            <a:r>
-              <a:rPr lang="en-US" sz="2000" dirty="0">
-                <a:solidFill>
-                  <a:srgbClr val="C7D5E0"/>
-                </a:solidFill>
-              </a:rPr>
-              <a:t> </a:t>
-            </a:r>
-            <a:r>
-              <a:rPr lang="en-US" sz="2000" dirty="0" err="1">
-                <a:solidFill>
-                  <a:srgbClr val="C7D5E0"/>
-                </a:solidFill>
-              </a:rPr>
-              <a:t>degli</a:t>
-            </a:r>
-            <a:r>
-              <a:rPr lang="en-US" sz="2000" dirty="0">
-                <a:solidFill>
-                  <a:srgbClr val="C7D5E0"/>
-                </a:solidFill>
-              </a:rPr>
-              <a:t> </a:t>
-            </a:r>
-            <a:r>
-              <a:rPr lang="en-US" sz="2000" dirty="0" err="1">
-                <a:solidFill>
-                  <a:srgbClr val="C7D5E0"/>
-                </a:solidFill>
-              </a:rPr>
-              <a:t>utenti</a:t>
-            </a:r>
-            <a:r>
-              <a:rPr lang="en-US" sz="2000" dirty="0">
-                <a:solidFill>
-                  <a:srgbClr val="C7D5E0"/>
-                </a:solidFill>
-              </a:rPr>
-              <a:t> in </a:t>
-            </a:r>
-            <a:r>
-              <a:rPr lang="en-US" sz="2000" dirty="0" err="1">
-                <a:solidFill>
-                  <a:srgbClr val="C7D5E0"/>
-                </a:solidFill>
-              </a:rPr>
-              <a:t>situazioni</a:t>
-            </a:r>
-            <a:r>
-              <a:rPr lang="en-US" sz="2000" dirty="0">
-                <a:solidFill>
-                  <a:srgbClr val="C7D5E0"/>
-                </a:solidFill>
-              </a:rPr>
-              <a:t> </a:t>
-            </a:r>
-            <a:r>
-              <a:rPr lang="en-US" sz="2000" dirty="0" err="1">
-                <a:solidFill>
-                  <a:srgbClr val="C7D5E0"/>
-                </a:solidFill>
-              </a:rPr>
-              <a:t>sociali</a:t>
-            </a:r>
-            <a:r>
-              <a:rPr lang="en-US" sz="2000" dirty="0">
-                <a:solidFill>
-                  <a:srgbClr val="C7D5E0"/>
-                </a:solidFill>
-              </a:rPr>
-              <a:t> </a:t>
-            </a:r>
-            <a:r>
-              <a:rPr lang="en-US" sz="2000" dirty="0" err="1">
-                <a:solidFill>
-                  <a:srgbClr val="C7D5E0"/>
-                </a:solidFill>
-              </a:rPr>
-              <a:t>differenti</a:t>
-            </a:r>
-            <a:r>
-              <a:rPr lang="en-US" sz="2000" dirty="0">
-                <a:solidFill>
-                  <a:srgbClr val="C7D5E0"/>
-                </a:solidFill>
-              </a:rPr>
-              <a:t>.</a:t>
+              <a:rPr lang="en-US" sz="2000">
+                <a:solidFill>
+                  <a:srgbClr val="C7D5E0"/>
+                </a:solidFill>
+              </a:rPr>
+              <a:t>Si analizza il numero di </a:t>
+            </a:r>
+            <a:r>
+              <a:rPr lang="en-US" sz="2000">
+                <a:solidFill>
+                  <a:srgbClr val="66C0F4"/>
+                </a:solidFill>
+              </a:rPr>
+              <a:t>acquisti </a:t>
+            </a:r>
+            <a:r>
+              <a:rPr lang="en-US" sz="2000">
+                <a:solidFill>
+                  <a:srgbClr val="C7D5E0"/>
+                </a:solidFill>
+              </a:rPr>
+              <a:t>di VG per ciascuna delle categorie di </a:t>
+            </a:r>
+            <a:r>
+              <a:rPr lang="en-US" sz="2000">
+                <a:solidFill>
+                  <a:srgbClr val="66C0F4"/>
+                </a:solidFill>
+              </a:rPr>
+              <a:t>socialita’</a:t>
+            </a:r>
+            <a:r>
+              <a:rPr lang="en-US" sz="2000">
+                <a:solidFill>
+                  <a:srgbClr val="C7D5E0"/>
+                </a:solidFill>
+              </a:rPr>
+              <a:t> del prodotto, durante i tre periodi analizzati, per poter mettere in evidenza differenze nelle preferenze di acquisto degli utenti in situazioni sociali differenti.</a:t>
             </a:r>
           </a:p>
           <a:p>
@@ -4055,108 +4207,28 @@
               </a:buClr>
             </a:pPr>
             <a:r>
-              <a:rPr lang="en-US" sz="2000" dirty="0">
-                <a:solidFill>
-                  <a:srgbClr val="C7D5E0"/>
-                </a:solidFill>
-              </a:rPr>
-              <a:t>I VG </a:t>
-            </a:r>
-            <a:r>
-              <a:rPr lang="en-US" sz="2000" dirty="0" err="1">
-                <a:solidFill>
-                  <a:srgbClr val="C7D5E0"/>
-                </a:solidFill>
-              </a:rPr>
-              <a:t>si</a:t>
-            </a:r>
-            <a:r>
-              <a:rPr lang="en-US" sz="2000" dirty="0">
-                <a:solidFill>
-                  <a:srgbClr val="C7D5E0"/>
-                </a:solidFill>
-              </a:rPr>
-              <a:t> </a:t>
-            </a:r>
-            <a:r>
-              <a:rPr lang="en-US" sz="2000" dirty="0" err="1">
-                <a:solidFill>
-                  <a:srgbClr val="C7D5E0"/>
-                </a:solidFill>
-              </a:rPr>
-              <a:t>distribuiscono</a:t>
-            </a:r>
-            <a:r>
-              <a:rPr lang="en-US" sz="2000" dirty="0">
-                <a:solidFill>
-                  <a:srgbClr val="C7D5E0"/>
-                </a:solidFill>
-              </a:rPr>
-              <a:t> piu’ o </a:t>
-            </a:r>
-            <a:r>
-              <a:rPr lang="en-US" sz="2000" dirty="0" err="1">
-                <a:solidFill>
-                  <a:srgbClr val="C7D5E0"/>
-                </a:solidFill>
-              </a:rPr>
-              <a:t>meno</a:t>
-            </a:r>
-            <a:r>
-              <a:rPr lang="en-US" sz="2000" dirty="0">
-                <a:solidFill>
-                  <a:srgbClr val="C7D5E0"/>
-                </a:solidFill>
-              </a:rPr>
-              <a:t> </a:t>
-            </a:r>
-            <a:r>
-              <a:rPr lang="en-US" sz="2000" dirty="0" err="1">
-                <a:solidFill>
-                  <a:srgbClr val="66C0F4"/>
-                </a:solidFill>
-              </a:rPr>
-              <a:t>uniformemente</a:t>
-            </a:r>
-            <a:r>
-              <a:rPr lang="en-US" sz="2000" dirty="0">
-                <a:solidFill>
-                  <a:srgbClr val="66C0F4"/>
-                </a:solidFill>
-              </a:rPr>
-              <a:t> </a:t>
-            </a:r>
-            <a:r>
-              <a:rPr lang="en-US" sz="2000" dirty="0" err="1">
-                <a:solidFill>
-                  <a:srgbClr val="C7D5E0"/>
-                </a:solidFill>
-              </a:rPr>
-              <a:t>tra</a:t>
-            </a:r>
-            <a:r>
-              <a:rPr lang="en-US" sz="2000" dirty="0">
-                <a:solidFill>
-                  <a:srgbClr val="C7D5E0"/>
-                </a:solidFill>
-              </a:rPr>
-              <a:t> le </a:t>
-            </a:r>
-            <a:r>
-              <a:rPr lang="en-US" sz="2000" dirty="0" err="1">
-                <a:solidFill>
-                  <a:srgbClr val="C7D5E0"/>
-                </a:solidFill>
-              </a:rPr>
-              <a:t>categorie</a:t>
-            </a:r>
-            <a:r>
-              <a:rPr lang="en-US" sz="2000" dirty="0">
-                <a:solidFill>
-                  <a:srgbClr val="C7D5E0"/>
-                </a:solidFill>
-              </a:rPr>
-              <a:t>.</a:t>
+              <a:rPr lang="en-US" sz="2000">
+                <a:solidFill>
+                  <a:srgbClr val="C7D5E0"/>
+                </a:solidFill>
+              </a:rPr>
+              <a:t>I VG si distribuiscono piu’ o meno </a:t>
+            </a:r>
+            <a:r>
+              <a:rPr lang="en-US" sz="2000">
+                <a:solidFill>
+                  <a:srgbClr val="66C0F4"/>
+                </a:solidFill>
+              </a:rPr>
+              <a:t>uniformemente </a:t>
+            </a:r>
+            <a:r>
+              <a:rPr lang="en-US" sz="2000">
+                <a:solidFill>
+                  <a:srgbClr val="C7D5E0"/>
+                </a:solidFill>
+              </a:rPr>
+              <a:t>tra le categorie di gruppo e quelle in singolo.</a:t>
             </a:r>
           </a:p>
           <a:p>
@@ -4166,31 +4238,15 @@
               </a:buClr>
             </a:pPr>
             <a:r>
-              <a:rPr lang="en-US" sz="2000" dirty="0">
-                <a:solidFill>
-                  <a:srgbClr val="C7D5E0"/>
-                </a:solidFill>
-              </a:rPr>
-              <a:t>Si </a:t>
-            </a:r>
-            <a:r>
-              <a:rPr lang="en-US" sz="2000" dirty="0" err="1">
-                <a:solidFill>
-                  <a:srgbClr val="C7D5E0"/>
-                </a:solidFill>
-              </a:rPr>
-              <a:t>evidenzia</a:t>
-            </a:r>
-            <a:r>
-              <a:rPr lang="en-US" sz="2000" dirty="0">
-                <a:solidFill>
-                  <a:srgbClr val="C7D5E0"/>
-                </a:solidFill>
-              </a:rPr>
-              <a:t> un </a:t>
-            </a:r>
-            <a:r>
-              <a:rPr lang="en-US" sz="2000" dirty="0">
+              <a:rPr lang="en-US" sz="2000">
+                <a:solidFill>
+                  <a:srgbClr val="C7D5E0"/>
+                </a:solidFill>
+              </a:rPr>
+              <a:t>Si evidenzia un </a:t>
+            </a:r>
+            <a:r>
+              <a:rPr lang="en-US" sz="2000">
                 <a:solidFill>
                   <a:srgbClr val="66C0F4"/>
                 </a:solidFill>
@@ -4198,100 +4254,12 @@
               <a:t>leggero </a:t>
             </a:r>
             <a:r>
-              <a:rPr lang="en-US" sz="2000" dirty="0" err="1">
-                <a:solidFill>
-                  <a:srgbClr val="C7D5E0"/>
-                </a:solidFill>
-              </a:rPr>
-              <a:t>aumento</a:t>
-            </a:r>
-            <a:r>
-              <a:rPr lang="en-US" sz="2000" dirty="0">
-                <a:solidFill>
-                  <a:srgbClr val="C7D5E0"/>
-                </a:solidFill>
-              </a:rPr>
-              <a:t> </a:t>
-            </a:r>
-            <a:r>
-              <a:rPr lang="en-US" sz="2000" dirty="0" err="1">
-                <a:solidFill>
-                  <a:srgbClr val="C7D5E0"/>
-                </a:solidFill>
-              </a:rPr>
-              <a:t>della</a:t>
-            </a:r>
-            <a:r>
-              <a:rPr lang="en-US" sz="2000" dirty="0">
-                <a:solidFill>
-                  <a:srgbClr val="C7D5E0"/>
-                </a:solidFill>
-              </a:rPr>
-              <a:t> </a:t>
-            </a:r>
-            <a:r>
-              <a:rPr lang="en-US" sz="2000" dirty="0" err="1">
-                <a:solidFill>
-                  <a:srgbClr val="C7D5E0"/>
-                </a:solidFill>
-              </a:rPr>
-              <a:t>popolarita</a:t>
-            </a:r>
-            <a:r>
-              <a:rPr lang="en-US" sz="2000" dirty="0">
-                <a:solidFill>
-                  <a:srgbClr val="C7D5E0"/>
-                </a:solidFill>
-              </a:rPr>
-              <a:t>’ </a:t>
-            </a:r>
-            <a:r>
-              <a:rPr lang="en-US" sz="2000" dirty="0" err="1">
-                <a:solidFill>
-                  <a:srgbClr val="C7D5E0"/>
-                </a:solidFill>
-              </a:rPr>
-              <a:t>della</a:t>
-            </a:r>
-            <a:r>
-              <a:rPr lang="en-US" sz="2000" dirty="0">
-                <a:solidFill>
-                  <a:srgbClr val="C7D5E0"/>
-                </a:solidFill>
-              </a:rPr>
-              <a:t> </a:t>
-            </a:r>
-            <a:r>
-              <a:rPr lang="en-US" sz="2000" dirty="0" err="1">
-                <a:solidFill>
-                  <a:srgbClr val="C7D5E0"/>
-                </a:solidFill>
-              </a:rPr>
-              <a:t>componente</a:t>
-            </a:r>
-            <a:r>
-              <a:rPr lang="en-US" sz="2000" dirty="0">
-                <a:solidFill>
-                  <a:srgbClr val="C7D5E0"/>
-                </a:solidFill>
-              </a:rPr>
-              <a:t> Co-op </a:t>
-            </a:r>
-            <a:r>
-              <a:rPr lang="en-US" sz="2000" dirty="0" err="1">
-                <a:solidFill>
-                  <a:srgbClr val="C7D5E0"/>
-                </a:solidFill>
-              </a:rPr>
-              <a:t>durante</a:t>
-            </a:r>
-            <a:r>
-              <a:rPr lang="en-US" sz="2000" dirty="0">
-                <a:solidFill>
-                  <a:srgbClr val="C7D5E0"/>
-                </a:solidFill>
-              </a:rPr>
-              <a:t> il Covid19</a:t>
+              <a:rPr lang="en-US" sz="2000">
+                <a:solidFill>
+                  <a:srgbClr val="C7D5E0"/>
+                </a:solidFill>
+              </a:rPr>
+              <a:t>aumento della popolarita’ della componente Co-op durante il Covid19</a:t>
             </a:r>
           </a:p>
           <a:p>
@@ -4301,71 +4269,15 @@
               </a:buClr>
             </a:pPr>
             <a:r>
-              <a:rPr lang="en-US" sz="2000" dirty="0" err="1">
-                <a:solidFill>
-                  <a:srgbClr val="C7D5E0"/>
-                </a:solidFill>
-              </a:rPr>
-              <a:t>Mentre</a:t>
-            </a:r>
-            <a:r>
-              <a:rPr lang="en-US" sz="2000" dirty="0">
-                <a:solidFill>
-                  <a:srgbClr val="C7D5E0"/>
-                </a:solidFill>
-              </a:rPr>
-              <a:t> la </a:t>
-            </a:r>
-            <a:r>
-              <a:rPr lang="en-US" sz="2000" dirty="0" err="1">
-                <a:solidFill>
-                  <a:srgbClr val="C7D5E0"/>
-                </a:solidFill>
-              </a:rPr>
-              <a:t>componente</a:t>
-            </a:r>
-            <a:r>
-              <a:rPr lang="en-US" sz="2000" dirty="0">
-                <a:solidFill>
-                  <a:srgbClr val="C7D5E0"/>
-                </a:solidFill>
-              </a:rPr>
-              <a:t> </a:t>
-            </a:r>
-            <a:r>
-              <a:rPr lang="en-US" sz="2000" dirty="0" err="1">
-                <a:solidFill>
-                  <a:srgbClr val="C7D5E0"/>
-                </a:solidFill>
-              </a:rPr>
-              <a:t>SinglePlayer</a:t>
-            </a:r>
-            <a:r>
-              <a:rPr lang="en-US" sz="2000" dirty="0">
-                <a:solidFill>
-                  <a:srgbClr val="C7D5E0"/>
-                </a:solidFill>
-              </a:rPr>
-              <a:t> </a:t>
-            </a:r>
-            <a:r>
-              <a:rPr lang="en-US" sz="2000" dirty="0" err="1">
-                <a:solidFill>
-                  <a:srgbClr val="C7D5E0"/>
-                </a:solidFill>
-              </a:rPr>
-              <a:t>registra</a:t>
-            </a:r>
-            <a:r>
-              <a:rPr lang="en-US" sz="2000" dirty="0">
-                <a:solidFill>
-                  <a:srgbClr val="C7D5E0"/>
-                </a:solidFill>
-              </a:rPr>
-              <a:t> un </a:t>
-            </a:r>
-            <a:r>
-              <a:rPr lang="en-US" sz="2000" dirty="0">
+              <a:rPr lang="en-US" sz="2000">
+                <a:solidFill>
+                  <a:srgbClr val="C7D5E0"/>
+                </a:solidFill>
+              </a:rPr>
+              <a:t>Mentre la componente SinglePlayer registra un </a:t>
+            </a:r>
+            <a:r>
+              <a:rPr lang="en-US" sz="2000">
                 <a:solidFill>
                   <a:srgbClr val="66C0F4"/>
                 </a:solidFill>
@@ -4373,54 +4285,27 @@
               <a:t>leggero</a:t>
             </a:r>
             <a:r>
-              <a:rPr lang="en-US" sz="2000" dirty="0">
-                <a:solidFill>
-                  <a:srgbClr val="C7D5E0"/>
-                </a:solidFill>
-              </a:rPr>
-              <a:t> </a:t>
-            </a:r>
-            <a:r>
-              <a:rPr lang="en-US" sz="2000" dirty="0" err="1">
-                <a:solidFill>
-                  <a:srgbClr val="C7D5E0"/>
-                </a:solidFill>
-              </a:rPr>
-              <a:t>aumento</a:t>
-            </a:r>
-            <a:r>
-              <a:rPr lang="en-US" sz="2000" dirty="0">
-                <a:solidFill>
-                  <a:srgbClr val="C7D5E0"/>
-                </a:solidFill>
-              </a:rPr>
-              <a:t> </a:t>
-            </a:r>
-            <a:r>
-              <a:rPr lang="en-US" sz="2000" dirty="0" err="1">
-                <a:solidFill>
-                  <a:srgbClr val="C7D5E0"/>
-                </a:solidFill>
-              </a:rPr>
-              <a:t>nel</a:t>
-            </a:r>
-            <a:r>
-              <a:rPr lang="en-US" sz="2000" dirty="0">
-                <a:solidFill>
-                  <a:srgbClr val="C7D5E0"/>
-                </a:solidFill>
-              </a:rPr>
-              <a:t> period post-Covid19</a:t>
-            </a:r>
+              <a:rPr lang="en-US" sz="2000">
+                <a:solidFill>
+                  <a:srgbClr val="C7D5E0"/>
+                </a:solidFill>
+              </a:rPr>
+              <a:t> aumento nel period post-Covid19</a:t>
+            </a:r>
+            <a:endParaRPr lang="en-US" sz="2000" dirty="0">
+              <a:solidFill>
+                <a:srgbClr val="C7D5E0"/>
+              </a:solidFill>
+            </a:endParaRPr>
           </a:p>
         </p:txBody>
       </p:sp>
       <p:pic>
         <p:nvPicPr>
-          <p:cNvPr id="9" name="Immagine 8" descr="Immagine che contiene testo, cerchio, schermata, Carattere&#10;&#10;Descrizione generata automaticamente">
+          <p:cNvPr id="11" name="Immagine 10" descr="Immagine che contiene testo, cerchio, schermata, Policromia&#10;&#10;Descrizione generata automaticamente">
             <a:extLst>
               <a:ext uri="{FF2B5EF4-FFF2-40B4-BE49-F238E27FC236}">
-                <a16:creationId xmlns:a16="http://schemas.microsoft.com/office/drawing/2014/main" id="{B0283708-57D4-216D-EB58-FD0E670373CB}"/>
+                <a16:creationId xmlns:a16="http://schemas.microsoft.com/office/drawing/2014/main" id="{3FD6F79F-300C-6BB5-229A-D1616D9A88D9}"/>
               </a:ext>
             </a:extLst>
           </p:cNvPr>
@@ -4443,8 +4328,8 @@
         </p:blipFill>
         <p:spPr>
           <a:xfrm>
-            <a:off x="2501900" y="528870"/>
-            <a:ext cx="12192000" cy="6074357"/>
+            <a:off x="5869969" y="650816"/>
+            <a:ext cx="6047482" cy="6047482"/>
           </a:xfrm>
           <a:prstGeom prst="rect">
             <a:avLst/>
@@ -4611,8 +4496,8 @@
         </p:blipFill>
         <p:spPr>
           <a:xfrm>
-            <a:off x="5089066" y="937577"/>
-            <a:ext cx="6828385" cy="5121289"/>
+            <a:off x="6096000" y="1421672"/>
+            <a:ext cx="5196517" cy="3897388"/>
           </a:xfrm>
           <a:prstGeom prst="rect">
             <a:avLst/>
@@ -4633,7 +4518,7 @@
         </p:nvSpPr>
         <p:spPr>
           <a:xfrm>
-            <a:off x="274549" y="2205560"/>
+            <a:off x="899483" y="2136338"/>
             <a:ext cx="4119495" cy="2585323"/>
           </a:xfrm>
           <a:prstGeom prst="rect">
@@ -6410,212 +6295,6 @@
           </a:effectLst>
         </p:spPr>
       </p:pic>
-      <p:sp>
-        <p:nvSpPr>
-          <p:cNvPr id="8" name="Segnaposto contenuto 2">
-            <a:extLst>
-              <a:ext uri="{FF2B5EF4-FFF2-40B4-BE49-F238E27FC236}">
-                <a16:creationId xmlns:a16="http://schemas.microsoft.com/office/drawing/2014/main" id="{9AC6048C-0D31-1711-9B62-7F19EBC37E3B}"/>
-              </a:ext>
-            </a:extLst>
-          </p:cNvPr>
-          <p:cNvSpPr txBox="1">
-            <a:spLocks/>
-          </p:cNvSpPr>
-          <p:nvPr/>
-        </p:nvSpPr>
-        <p:spPr>
-          <a:xfrm>
-            <a:off x="274549" y="2405128"/>
-            <a:ext cx="3051756" cy="2047741"/>
-          </a:xfrm>
-          <a:prstGeom prst="rect">
-            <a:avLst/>
-          </a:prstGeom>
-        </p:spPr>
-        <p:txBody>
-          <a:bodyPr vert="horz" lIns="91440" tIns="45720" rIns="91440" bIns="45720" rtlCol="0">
-            <a:normAutofit/>
-          </a:bodyPr>
-          <a:lstStyle>
-            <a:lvl1pPr marL="228600" indent="-228600" algn="l" defTabSz="914400" rtl="0" eaLnBrk="1" latinLnBrk="0" hangingPunct="1">
-              <a:lnSpc>
-                <a:spcPct val="90000"/>
-              </a:lnSpc>
-              <a:spcBef>
-                <a:spcPts val="1000"/>
-              </a:spcBef>
-              <a:buFont typeface="Arial" panose="020B0604020202020204" pitchFamily="34" charset="0"/>
-              <a:buChar char="•"/>
-              <a:defRPr sz="2800" kern="1200">
-                <a:solidFill>
-                  <a:schemeClr val="tx1"/>
-                </a:solidFill>
-                <a:latin typeface="+mn-lt"/>
-                <a:ea typeface="+mn-ea"/>
-                <a:cs typeface="+mn-cs"/>
-              </a:defRPr>
-            </a:lvl1pPr>
-            <a:lvl2pPr marL="685800" indent="-228600" algn="l" defTabSz="914400" rtl="0" eaLnBrk="1" latinLnBrk="0" hangingPunct="1">
-              <a:lnSpc>
-                <a:spcPct val="90000"/>
-              </a:lnSpc>
-              <a:spcBef>
-                <a:spcPts val="500"/>
-              </a:spcBef>
-              <a:buFont typeface="Arial" panose="020B0604020202020204" pitchFamily="34" charset="0"/>
-              <a:buChar char="•"/>
-              <a:defRPr sz="2400" kern="1200">
-                <a:solidFill>
-                  <a:schemeClr val="tx1"/>
-                </a:solidFill>
-                <a:latin typeface="+mn-lt"/>
-                <a:ea typeface="+mn-ea"/>
-                <a:cs typeface="+mn-cs"/>
-              </a:defRPr>
-            </a:lvl2pPr>
-            <a:lvl3pPr marL="1143000" indent="-228600" algn="l" defTabSz="914400" rtl="0" eaLnBrk="1" latinLnBrk="0" hangingPunct="1">
-              <a:lnSpc>
-                <a:spcPct val="90000"/>
-              </a:lnSpc>
-              <a:spcBef>
-                <a:spcPts val="500"/>
-              </a:spcBef>
-              <a:buFont typeface="Arial" panose="020B0604020202020204" pitchFamily="34" charset="0"/>
-              <a:buChar char="•"/>
-              <a:defRPr sz="2000" kern="1200">
-                <a:solidFill>
-                  <a:schemeClr val="tx1"/>
-                </a:solidFill>
-                <a:latin typeface="+mn-lt"/>
-                <a:ea typeface="+mn-ea"/>
-                <a:cs typeface="+mn-cs"/>
-              </a:defRPr>
-            </a:lvl3pPr>
-            <a:lvl4pPr marL="1600200" indent="-228600" algn="l" defTabSz="914400" rtl="0" eaLnBrk="1" latinLnBrk="0" hangingPunct="1">
-              <a:lnSpc>
-                <a:spcPct val="90000"/>
-              </a:lnSpc>
-              <a:spcBef>
-                <a:spcPts val="500"/>
-              </a:spcBef>
-              <a:buFont typeface="Arial" panose="020B0604020202020204" pitchFamily="34" charset="0"/>
-              <a:buChar char="•"/>
-              <a:defRPr sz="1800" kern="1200">
-                <a:solidFill>
-                  <a:schemeClr val="tx1"/>
-                </a:solidFill>
-                <a:latin typeface="+mn-lt"/>
-                <a:ea typeface="+mn-ea"/>
-                <a:cs typeface="+mn-cs"/>
-              </a:defRPr>
-            </a:lvl4pPr>
-            <a:lvl5pPr marL="2057400" indent="-228600" algn="l" defTabSz="914400" rtl="0" eaLnBrk="1" latinLnBrk="0" hangingPunct="1">
-              <a:lnSpc>
-                <a:spcPct val="90000"/>
-              </a:lnSpc>
-              <a:spcBef>
-                <a:spcPts val="500"/>
-              </a:spcBef>
-              <a:buFont typeface="Arial" panose="020B0604020202020204" pitchFamily="34" charset="0"/>
-              <a:buChar char="•"/>
-              <a:defRPr sz="1800" kern="1200">
-                <a:solidFill>
-                  <a:schemeClr val="tx1"/>
-                </a:solidFill>
-                <a:latin typeface="+mn-lt"/>
-                <a:ea typeface="+mn-ea"/>
-                <a:cs typeface="+mn-cs"/>
-              </a:defRPr>
-            </a:lvl5pPr>
-            <a:lvl6pPr marL="2514600" indent="-228600" algn="l" defTabSz="914400" rtl="0" eaLnBrk="1" latinLnBrk="0" hangingPunct="1">
-              <a:lnSpc>
-                <a:spcPct val="90000"/>
-              </a:lnSpc>
-              <a:spcBef>
-                <a:spcPts val="500"/>
-              </a:spcBef>
-              <a:buFont typeface="Arial" panose="020B0604020202020204" pitchFamily="34" charset="0"/>
-              <a:buChar char="•"/>
-              <a:defRPr sz="1800" kern="1200">
-                <a:solidFill>
-                  <a:schemeClr val="tx1"/>
-                </a:solidFill>
-                <a:latin typeface="+mn-lt"/>
-                <a:ea typeface="+mn-ea"/>
-                <a:cs typeface="+mn-cs"/>
-              </a:defRPr>
-            </a:lvl6pPr>
-            <a:lvl7pPr marL="2971800" indent="-228600" algn="l" defTabSz="914400" rtl="0" eaLnBrk="1" latinLnBrk="0" hangingPunct="1">
-              <a:lnSpc>
-                <a:spcPct val="90000"/>
-              </a:lnSpc>
-              <a:spcBef>
-                <a:spcPts val="500"/>
-              </a:spcBef>
-              <a:buFont typeface="Arial" panose="020B0604020202020204" pitchFamily="34" charset="0"/>
-              <a:buChar char="•"/>
-              <a:defRPr sz="1800" kern="1200">
-                <a:solidFill>
-                  <a:schemeClr val="tx1"/>
-                </a:solidFill>
-                <a:latin typeface="+mn-lt"/>
-                <a:ea typeface="+mn-ea"/>
-                <a:cs typeface="+mn-cs"/>
-              </a:defRPr>
-            </a:lvl7pPr>
-            <a:lvl8pPr marL="3429000" indent="-228600" algn="l" defTabSz="914400" rtl="0" eaLnBrk="1" latinLnBrk="0" hangingPunct="1">
-              <a:lnSpc>
-                <a:spcPct val="90000"/>
-              </a:lnSpc>
-              <a:spcBef>
-                <a:spcPts val="500"/>
-              </a:spcBef>
-              <a:buFont typeface="Arial" panose="020B0604020202020204" pitchFamily="34" charset="0"/>
-              <a:buChar char="•"/>
-              <a:defRPr sz="1800" kern="1200">
-                <a:solidFill>
-                  <a:schemeClr val="tx1"/>
-                </a:solidFill>
-                <a:latin typeface="+mn-lt"/>
-                <a:ea typeface="+mn-ea"/>
-                <a:cs typeface="+mn-cs"/>
-              </a:defRPr>
-            </a:lvl8pPr>
-            <a:lvl9pPr marL="3886200" indent="-228600" algn="l" defTabSz="914400" rtl="0" eaLnBrk="1" latinLnBrk="0" hangingPunct="1">
-              <a:lnSpc>
-                <a:spcPct val="90000"/>
-              </a:lnSpc>
-              <a:spcBef>
-                <a:spcPts val="500"/>
-              </a:spcBef>
-              <a:buFont typeface="Arial" panose="020B0604020202020204" pitchFamily="34" charset="0"/>
-              <a:buChar char="•"/>
-              <a:defRPr sz="1800" kern="1200">
-                <a:solidFill>
-                  <a:schemeClr val="tx1"/>
-                </a:solidFill>
-                <a:latin typeface="+mn-lt"/>
-                <a:ea typeface="+mn-ea"/>
-                <a:cs typeface="+mn-cs"/>
-              </a:defRPr>
-            </a:lvl9pPr>
-          </a:lstStyle>
-          <a:p>
-            <a:pPr marL="0" indent="0">
-              <a:buClr>
-                <a:srgbClr val="66C0F4"/>
-              </a:buClr>
-              <a:buNone/>
-            </a:pPr>
-            <a:endParaRPr lang="en-US" sz="2000" dirty="0">
-              <a:solidFill>
-                <a:srgbClr val="66C0F4"/>
-              </a:solidFill>
-            </a:endParaRPr>
-          </a:p>
-        </p:txBody>
-      </p:sp>
       <p:pic>
         <p:nvPicPr>
           <p:cNvPr id="9" name="Immagine 8" descr="Immagine che contiene schermata, cerchio, Elementi grafici, astronomia&#10;&#10;Descrizione generata automaticamente">
@@ -6630,7 +6309,7 @@
           </p:cNvPicPr>
           <p:nvPr/>
         </p:nvPicPr>
-        <p:blipFill>
+        <p:blipFill rotWithShape="1">
           <a:blip r:embed="rId3">
             <a:extLst>
               <a:ext uri="{28A0092B-C50C-407E-A947-70E740481C1C}">
@@ -6638,14 +6317,13 @@
               </a:ext>
             </a:extLst>
           </a:blip>
-          <a:stretch>
-            <a:fillRect/>
-          </a:stretch>
+          <a:srcRect t="1016" r="22338"/>
+          <a:stretch/>
         </p:blipFill>
         <p:spPr>
           <a:xfrm>
-            <a:off x="2855352" y="1271016"/>
-            <a:ext cx="9062099" cy="4315968"/>
+            <a:off x="4428830" y="1321117"/>
+            <a:ext cx="7214073" cy="4379112"/>
           </a:xfrm>
           <a:prstGeom prst="rect">
             <a:avLst/>
@@ -7291,6 +6969,41 @@
           </a:p>
         </p:txBody>
       </p:sp>
+      <p:pic>
+        <p:nvPicPr>
+          <p:cNvPr id="2" name="Immagine 1" descr="Immagine che contiene schermata, cerchio, Elementi grafici, astronomia&#10;&#10;Descrizione generata automaticamente">
+            <a:extLst>
+              <a:ext uri="{FF2B5EF4-FFF2-40B4-BE49-F238E27FC236}">
+                <a16:creationId xmlns:a16="http://schemas.microsoft.com/office/drawing/2014/main" id="{829A5FF1-03F9-03EB-080F-0B2D1301BD53}"/>
+              </a:ext>
+            </a:extLst>
+          </p:cNvPr>
+          <p:cNvPicPr>
+            <a:picLocks noChangeAspect="1"/>
+          </p:cNvPicPr>
+          <p:nvPr/>
+        </p:nvPicPr>
+        <p:blipFill rotWithShape="1">
+          <a:blip r:embed="rId3">
+            <a:extLst>
+              <a:ext uri="{28A0092B-C50C-407E-A947-70E740481C1C}">
+                <a14:useLocalDpi xmlns:a14="http://schemas.microsoft.com/office/drawing/2010/main" val="0"/>
+              </a:ext>
+            </a:extLst>
+          </a:blip>
+          <a:srcRect l="86165" b="65442"/>
+          <a:stretch/>
+        </p:blipFill>
+        <p:spPr>
+          <a:xfrm>
+            <a:off x="5974877" y="1321118"/>
+            <a:ext cx="1149654" cy="1367674"/>
+          </a:xfrm>
+          <a:prstGeom prst="rect">
+            <a:avLst/>
+          </a:prstGeom>
+        </p:spPr>
+      </p:pic>
     </p:spTree>
     <p:extLst>
       <p:ext uri="{BB962C8B-B14F-4D97-AF65-F5344CB8AC3E}">
@@ -7464,8 +7177,8 @@
         </p:nvSpPr>
         <p:spPr>
           <a:xfrm>
-            <a:off x="838200" y="2690336"/>
-            <a:ext cx="3734874" cy="1754326"/>
+            <a:off x="838201" y="1326514"/>
+            <a:ext cx="10515599" cy="830997"/>
           </a:xfrm>
           <a:prstGeom prst="rect">
             <a:avLst/>
@@ -7479,7 +7192,7 @@
           <a:lstStyle/>
           <a:p>
             <a:r>
-              <a:rPr lang="en-US" dirty="0" err="1">
+              <a:rPr lang="en-US" sz="1600" dirty="0" err="1">
                 <a:solidFill>
                   <a:srgbClr val="C7D5E0"/>
                 </a:solidFill>
@@ -7487,15 +7200,15 @@
               <a:t>Nonostante</a:t>
             </a:r>
             <a:r>
-              <a:rPr lang="en-US" dirty="0">
-                <a:solidFill>
-                  <a:srgbClr val="C7D5E0"/>
-                </a:solidFill>
-              </a:rPr>
-              <a:t> </a:t>
-            </a:r>
-            <a:r>
-              <a:rPr lang="en-US" dirty="0" err="1">
+              <a:rPr lang="en-US" sz="1600" dirty="0">
+                <a:solidFill>
+                  <a:srgbClr val="C7D5E0"/>
+                </a:solidFill>
+              </a:rPr>
+              <a:t> </a:t>
+            </a:r>
+            <a:r>
+              <a:rPr lang="en-US" sz="1600" dirty="0" err="1">
                 <a:solidFill>
                   <a:srgbClr val="C7D5E0"/>
                 </a:solidFill>
@@ -7503,7 +7216,7 @@
               <a:t>i</a:t>
             </a:r>
             <a:r>
-              <a:rPr lang="en-US" dirty="0">
+              <a:rPr lang="en-US" sz="1600" dirty="0">
                 <a:solidFill>
                   <a:srgbClr val="C7D5E0"/>
                 </a:solidFill>
@@ -7511,7 +7224,7 @@
               <a:t> VG </a:t>
             </a:r>
             <a:r>
-              <a:rPr lang="en-US" dirty="0">
+              <a:rPr lang="en-US" sz="1600" dirty="0">
                 <a:solidFill>
                   <a:srgbClr val="66C0F4"/>
                 </a:solidFill>
@@ -7519,15 +7232,15 @@
               <a:t>F2P</a:t>
             </a:r>
             <a:r>
-              <a:rPr lang="en-US" dirty="0">
-                <a:solidFill>
-                  <a:srgbClr val="C7D5E0"/>
-                </a:solidFill>
-              </a:rPr>
-              <a:t> </a:t>
-            </a:r>
-            <a:r>
-              <a:rPr lang="en-US" dirty="0" err="1">
+              <a:rPr lang="en-US" sz="1600" dirty="0">
+                <a:solidFill>
+                  <a:srgbClr val="C7D5E0"/>
+                </a:solidFill>
+              </a:rPr>
+              <a:t> </a:t>
+            </a:r>
+            <a:r>
+              <a:rPr lang="en-US" sz="1600" dirty="0" err="1">
                 <a:solidFill>
                   <a:srgbClr val="C7D5E0"/>
                 </a:solidFill>
@@ -7535,15 +7248,15 @@
               <a:t>compongano</a:t>
             </a:r>
             <a:r>
-              <a:rPr lang="en-US" dirty="0">
-                <a:solidFill>
-                  <a:srgbClr val="C7D5E0"/>
-                </a:solidFill>
-              </a:rPr>
-              <a:t> </a:t>
-            </a:r>
-            <a:r>
-              <a:rPr lang="en-US" dirty="0" err="1">
+              <a:rPr lang="en-US" sz="1600" dirty="0">
+                <a:solidFill>
+                  <a:srgbClr val="C7D5E0"/>
+                </a:solidFill>
+              </a:rPr>
+              <a:t> </a:t>
+            </a:r>
+            <a:r>
+              <a:rPr lang="en-US" sz="1600" dirty="0" err="1">
                 <a:solidFill>
                   <a:srgbClr val="C7D5E0"/>
                 </a:solidFill>
@@ -7551,7 +7264,7 @@
               <a:t>solamente</a:t>
             </a:r>
             <a:r>
-              <a:rPr lang="en-US" dirty="0">
+              <a:rPr lang="en-US" sz="1600" dirty="0">
                 <a:solidFill>
                   <a:srgbClr val="C7D5E0"/>
                 </a:solidFill>
@@ -7559,7 +7272,7 @@
               <a:t> il 10% </a:t>
             </a:r>
             <a:r>
-              <a:rPr lang="en-US" dirty="0" err="1">
+              <a:rPr lang="en-US" sz="1600" dirty="0" err="1">
                 <a:solidFill>
                   <a:srgbClr val="C7D5E0"/>
                 </a:solidFill>
@@ -7567,15 +7280,15 @@
               <a:t>dei</a:t>
             </a:r>
             <a:r>
-              <a:rPr lang="en-US" dirty="0">
-                <a:solidFill>
-                  <a:srgbClr val="C7D5E0"/>
-                </a:solidFill>
-              </a:rPr>
-              <a:t> </a:t>
-            </a:r>
-            <a:r>
-              <a:rPr lang="en-US" dirty="0" err="1">
+              <a:rPr lang="en-US" sz="1600" dirty="0">
+                <a:solidFill>
+                  <a:srgbClr val="C7D5E0"/>
+                </a:solidFill>
+              </a:rPr>
+              <a:t> </a:t>
+            </a:r>
+            <a:r>
+              <a:rPr lang="en-US" sz="1600" dirty="0" err="1">
                 <a:solidFill>
                   <a:srgbClr val="C7D5E0"/>
                 </a:solidFill>
@@ -7583,7 +7296,7 @@
               <a:t>prodotti</a:t>
             </a:r>
             <a:r>
-              <a:rPr lang="en-US" dirty="0">
+              <a:rPr lang="en-US" sz="1600" dirty="0">
                 <a:solidFill>
                   <a:srgbClr val="C7D5E0"/>
                 </a:solidFill>
@@ -7591,7 +7304,7 @@
               <a:t> di </a:t>
             </a:r>
             <a:r>
-              <a:rPr lang="en-US" dirty="0">
+              <a:rPr lang="en-US" sz="1600" dirty="0">
                 <a:solidFill>
                   <a:srgbClr val="66C0F4"/>
                 </a:solidFill>
@@ -7599,7 +7312,7 @@
               <a:t>STEAM</a:t>
             </a:r>
             <a:r>
-              <a:rPr lang="en-US" dirty="0">
+              <a:rPr lang="en-US" sz="1600" dirty="0">
                 <a:solidFill>
                   <a:srgbClr val="C7D5E0"/>
                 </a:solidFill>
@@ -7607,7 +7320,7 @@
               <a:t>, la revenue </a:t>
             </a:r>
             <a:r>
-              <a:rPr lang="en-US" dirty="0" err="1">
+              <a:rPr lang="en-US" sz="1600" dirty="0" err="1">
                 <a:solidFill>
                   <a:srgbClr val="C7D5E0"/>
                 </a:solidFill>
@@ -7615,7 +7328,7 @@
               <a:t>mondiale</a:t>
             </a:r>
             <a:r>
-              <a:rPr lang="en-US" dirty="0">
+              <a:rPr lang="en-US" sz="1600" dirty="0">
                 <a:solidFill>
                   <a:srgbClr val="C7D5E0"/>
                 </a:solidFill>
@@ -7623,7 +7336,7 @@
               <a:t> data </a:t>
             </a:r>
             <a:r>
-              <a:rPr lang="en-US" dirty="0" err="1">
+              <a:rPr lang="en-US" sz="1600" dirty="0" err="1">
                 <a:solidFill>
                   <a:srgbClr val="C7D5E0"/>
                 </a:solidFill>
@@ -7631,15 +7344,15 @@
               <a:t>dai</a:t>
             </a:r>
             <a:r>
-              <a:rPr lang="en-US" dirty="0">
-                <a:solidFill>
-                  <a:srgbClr val="C7D5E0"/>
-                </a:solidFill>
-              </a:rPr>
-              <a:t> </a:t>
-            </a:r>
-            <a:r>
-              <a:rPr lang="en-US" dirty="0" err="1">
+              <a:rPr lang="en-US" sz="1600" dirty="0">
+                <a:solidFill>
+                  <a:srgbClr val="C7D5E0"/>
+                </a:solidFill>
+              </a:rPr>
+              <a:t> </a:t>
+            </a:r>
+            <a:r>
+              <a:rPr lang="en-US" sz="1600" dirty="0" err="1">
                 <a:solidFill>
                   <a:srgbClr val="C7D5E0"/>
                 </a:solidFill>
@@ -7647,15 +7360,15 @@
               <a:t>contenuti</a:t>
             </a:r>
             <a:r>
-              <a:rPr lang="en-US" dirty="0">
-                <a:solidFill>
-                  <a:srgbClr val="C7D5E0"/>
-                </a:solidFill>
-              </a:rPr>
-              <a:t> </a:t>
-            </a:r>
-            <a:r>
-              <a:rPr lang="en-US" dirty="0" err="1">
+              <a:rPr lang="en-US" sz="1600" dirty="0">
+                <a:solidFill>
+                  <a:srgbClr val="C7D5E0"/>
+                </a:solidFill>
+              </a:rPr>
+              <a:t> </a:t>
+            </a:r>
+            <a:r>
+              <a:rPr lang="en-US" sz="1600" dirty="0" err="1">
                 <a:solidFill>
                   <a:srgbClr val="C7D5E0"/>
                 </a:solidFill>
@@ -7663,15 +7376,15 @@
               <a:t>aggiuntivi</a:t>
             </a:r>
             <a:r>
-              <a:rPr lang="en-US">
-                <a:solidFill>
-                  <a:srgbClr val="C7D5E0"/>
-                </a:solidFill>
-              </a:rPr>
-              <a:t> </a:t>
-            </a:r>
-            <a:r>
-              <a:rPr lang="en-US" dirty="0" err="1">
+              <a:rPr lang="en-US" sz="1600" dirty="0">
+                <a:solidFill>
+                  <a:srgbClr val="C7D5E0"/>
+                </a:solidFill>
+              </a:rPr>
+              <a:t> </a:t>
+            </a:r>
+            <a:r>
+              <a:rPr lang="en-US" sz="1600" dirty="0" err="1">
                 <a:solidFill>
                   <a:srgbClr val="C7D5E0"/>
                 </a:solidFill>
@@ -7679,15 +7392,15 @@
               <a:t>supera</a:t>
             </a:r>
             <a:r>
-              <a:rPr lang="en-US" dirty="0">
-                <a:solidFill>
-                  <a:srgbClr val="C7D5E0"/>
-                </a:solidFill>
-              </a:rPr>
-              <a:t> </a:t>
-            </a:r>
-            <a:r>
-              <a:rPr lang="en-US" dirty="0" err="1">
+              <a:rPr lang="en-US" sz="1600" dirty="0">
+                <a:solidFill>
+                  <a:srgbClr val="C7D5E0"/>
+                </a:solidFill>
+              </a:rPr>
+              <a:t> </a:t>
+            </a:r>
+            <a:r>
+              <a:rPr lang="en-US" sz="1600" dirty="0" err="1">
                 <a:solidFill>
                   <a:srgbClr val="C7D5E0"/>
                 </a:solidFill>
@@ -7695,7 +7408,7 @@
               <a:t>ormai</a:t>
             </a:r>
             <a:r>
-              <a:rPr lang="en-US" dirty="0">
+              <a:rPr lang="en-US" sz="1600" dirty="0">
                 <a:solidFill>
                   <a:srgbClr val="C7D5E0"/>
                 </a:solidFill>
@@ -7703,7 +7416,7 @@
               <a:t> di molto </a:t>
             </a:r>
             <a:r>
-              <a:rPr lang="en-US" dirty="0" err="1">
+              <a:rPr lang="en-US" sz="1600" dirty="0" err="1">
                 <a:solidFill>
                   <a:srgbClr val="C7D5E0"/>
                 </a:solidFill>
@@ -7711,15 +7424,15 @@
               <a:t>quella</a:t>
             </a:r>
             <a:r>
-              <a:rPr lang="en-US" dirty="0">
-                <a:solidFill>
-                  <a:srgbClr val="C7D5E0"/>
-                </a:solidFill>
-              </a:rPr>
-              <a:t> </a:t>
-            </a:r>
-            <a:r>
-              <a:rPr lang="en-US" dirty="0" err="1">
+              <a:rPr lang="en-US" sz="1600" dirty="0">
+                <a:solidFill>
+                  <a:srgbClr val="C7D5E0"/>
+                </a:solidFill>
+              </a:rPr>
+              <a:t> </a:t>
+            </a:r>
+            <a:r>
+              <a:rPr lang="en-US" sz="1600" dirty="0" err="1">
                 <a:solidFill>
                   <a:srgbClr val="C7D5E0"/>
                 </a:solidFill>
@@ -7727,15 +7440,15 @@
               <a:t>dei</a:t>
             </a:r>
             <a:r>
-              <a:rPr lang="en-US" dirty="0">
-                <a:solidFill>
-                  <a:srgbClr val="C7D5E0"/>
-                </a:solidFill>
-              </a:rPr>
-              <a:t> </a:t>
-            </a:r>
-            <a:r>
-              <a:rPr lang="en-US" dirty="0" err="1">
+              <a:rPr lang="en-US" sz="1600" dirty="0">
+                <a:solidFill>
+                  <a:srgbClr val="C7D5E0"/>
+                </a:solidFill>
+              </a:rPr>
+              <a:t> </a:t>
+            </a:r>
+            <a:r>
+              <a:rPr lang="en-US" sz="1600" dirty="0" err="1">
                 <a:solidFill>
                   <a:srgbClr val="C7D5E0"/>
                 </a:solidFill>
@@ -7743,15 +7456,15 @@
               <a:t>videogiochi</a:t>
             </a:r>
             <a:r>
-              <a:rPr lang="en-US" dirty="0">
-                <a:solidFill>
-                  <a:srgbClr val="C7D5E0"/>
-                </a:solidFill>
-              </a:rPr>
-              <a:t> </a:t>
-            </a:r>
-            <a:r>
-              <a:rPr lang="en-US" dirty="0">
+              <a:rPr lang="en-US" sz="1600" dirty="0">
+                <a:solidFill>
+                  <a:srgbClr val="C7D5E0"/>
+                </a:solidFill>
+              </a:rPr>
+              <a:t> </a:t>
+            </a:r>
+            <a:r>
+              <a:rPr lang="en-US" sz="1600" dirty="0">
                 <a:solidFill>
                   <a:srgbClr val="66C0F4"/>
                 </a:solidFill>
@@ -7759,16 +7472,238 @@
               <a:t>P2P</a:t>
             </a:r>
             <a:r>
-              <a:rPr lang="en-US" dirty="0">
-                <a:solidFill>
-                  <a:srgbClr val="C7D5E0"/>
-                </a:solidFill>
-              </a:rPr>
-              <a:t> (Premium).</a:t>
+              <a:rPr lang="en-US" sz="1600" dirty="0">
+                <a:solidFill>
+                  <a:srgbClr val="C7D5E0"/>
+                </a:solidFill>
+              </a:rPr>
+              <a:t> (Premium)</a:t>
+            </a:r>
+          </a:p>
+          <a:p>
+            <a:r>
+              <a:rPr lang="en-US" sz="1600" dirty="0">
+                <a:solidFill>
+                  <a:srgbClr val="C7D5E0"/>
+                </a:solidFill>
+              </a:rPr>
+              <a:t>La </a:t>
+            </a:r>
+            <a:r>
+              <a:rPr lang="en-US" sz="1600" dirty="0" err="1">
+                <a:solidFill>
+                  <a:srgbClr val="66C0F4"/>
+                </a:solidFill>
+              </a:rPr>
+              <a:t>previsione</a:t>
+            </a:r>
+            <a:r>
+              <a:rPr lang="en-US" sz="1600" dirty="0">
+                <a:solidFill>
+                  <a:srgbClr val="C7D5E0"/>
+                </a:solidFill>
+              </a:rPr>
+              <a:t> e’ </a:t>
+            </a:r>
+            <a:r>
+              <a:rPr lang="en-US" sz="1600" dirty="0" err="1">
+                <a:solidFill>
+                  <a:srgbClr val="C7D5E0"/>
+                </a:solidFill>
+              </a:rPr>
+              <a:t>che</a:t>
+            </a:r>
+            <a:r>
+              <a:rPr lang="en-US" sz="1600" dirty="0">
+                <a:solidFill>
+                  <a:srgbClr val="C7D5E0"/>
+                </a:solidFill>
+              </a:rPr>
+              <a:t> tale </a:t>
+            </a:r>
+            <a:r>
+              <a:rPr lang="en-US" sz="1600" dirty="0" err="1">
+                <a:solidFill>
+                  <a:srgbClr val="C7D5E0"/>
+                </a:solidFill>
+              </a:rPr>
+              <a:t>valore</a:t>
+            </a:r>
+            <a:r>
+              <a:rPr lang="en-US" sz="1600" dirty="0">
+                <a:solidFill>
+                  <a:srgbClr val="C7D5E0"/>
+                </a:solidFill>
+              </a:rPr>
+              <a:t> vada ad </a:t>
+            </a:r>
+            <a:r>
+              <a:rPr lang="en-US" sz="1600" dirty="0" err="1">
+                <a:solidFill>
+                  <a:srgbClr val="C7D5E0"/>
+                </a:solidFill>
+              </a:rPr>
+              <a:t>aumentare</a:t>
+            </a:r>
+            <a:r>
+              <a:rPr lang="en-US" sz="1600" dirty="0">
+                <a:solidFill>
+                  <a:srgbClr val="C7D5E0"/>
+                </a:solidFill>
+              </a:rPr>
+              <a:t> </a:t>
+            </a:r>
+            <a:r>
+              <a:rPr lang="en-US" sz="1600" dirty="0" err="1">
+                <a:solidFill>
+                  <a:srgbClr val="C7D5E0"/>
+                </a:solidFill>
+              </a:rPr>
+              <a:t>ulteriormente</a:t>
+            </a:r>
+            <a:r>
+              <a:rPr lang="en-US" sz="1600" dirty="0">
+                <a:solidFill>
+                  <a:srgbClr val="C7D5E0"/>
+                </a:solidFill>
+              </a:rPr>
+              <a:t> </a:t>
+            </a:r>
+            <a:r>
+              <a:rPr lang="en-US" sz="1600" dirty="0" err="1">
+                <a:solidFill>
+                  <a:srgbClr val="C7D5E0"/>
+                </a:solidFill>
+              </a:rPr>
+              <a:t>nei</a:t>
+            </a:r>
+            <a:r>
+              <a:rPr lang="en-US" sz="1600" dirty="0">
+                <a:solidFill>
+                  <a:srgbClr val="C7D5E0"/>
+                </a:solidFill>
+              </a:rPr>
+              <a:t> </a:t>
+            </a:r>
+            <a:r>
+              <a:rPr lang="en-US" sz="1600" dirty="0" err="1">
+                <a:solidFill>
+                  <a:srgbClr val="C7D5E0"/>
+                </a:solidFill>
+              </a:rPr>
+              <a:t>prossimi</a:t>
+            </a:r>
+            <a:r>
+              <a:rPr lang="en-US" sz="1600" dirty="0">
+                <a:solidFill>
+                  <a:srgbClr val="C7D5E0"/>
+                </a:solidFill>
+              </a:rPr>
+              <a:t> anni (</a:t>
+            </a:r>
+            <a:r>
+              <a:rPr lang="en-US" sz="1600" dirty="0" err="1">
+                <a:solidFill>
+                  <a:srgbClr val="C7D5E0"/>
+                </a:solidFill>
+              </a:rPr>
+              <a:t>si</a:t>
+            </a:r>
+            <a:r>
+              <a:rPr lang="en-US" sz="1600" dirty="0">
+                <a:solidFill>
+                  <a:srgbClr val="C7D5E0"/>
+                </a:solidFill>
+              </a:rPr>
+              <a:t> </a:t>
+            </a:r>
+            <a:r>
+              <a:rPr lang="en-US" sz="1600" dirty="0" err="1">
+                <a:solidFill>
+                  <a:srgbClr val="C7D5E0"/>
+                </a:solidFill>
+              </a:rPr>
+              <a:t>parla</a:t>
+            </a:r>
+            <a:r>
+              <a:rPr lang="en-US" sz="1600" dirty="0">
+                <a:solidFill>
+                  <a:srgbClr val="C7D5E0"/>
+                </a:solidFill>
+              </a:rPr>
+              <a:t> del </a:t>
+            </a:r>
+            <a:r>
+              <a:rPr lang="en-US" sz="1600" dirty="0">
+                <a:solidFill>
+                  <a:srgbClr val="66C0F4"/>
+                </a:solidFill>
+              </a:rPr>
+              <a:t>95% </a:t>
+            </a:r>
+            <a:r>
+              <a:rPr lang="en-US" sz="1600" dirty="0" err="1">
+                <a:solidFill>
+                  <a:srgbClr val="66C0F4"/>
+                </a:solidFill>
+              </a:rPr>
+              <a:t>nel</a:t>
+            </a:r>
+            <a:r>
+              <a:rPr lang="en-US" sz="1600" dirty="0">
+                <a:solidFill>
+                  <a:srgbClr val="66C0F4"/>
+                </a:solidFill>
+              </a:rPr>
+              <a:t> 2025</a:t>
+            </a:r>
+            <a:r>
+              <a:rPr lang="en-US" sz="1600" dirty="0">
+                <a:solidFill>
+                  <a:srgbClr val="C7D5E0"/>
+                </a:solidFill>
+              </a:rPr>
+              <a:t>).</a:t>
             </a:r>
           </a:p>
         </p:txBody>
       </p:sp>
+      <p:pic>
+        <p:nvPicPr>
+          <p:cNvPr id="6" name="Immagine 5" descr="Immagine che contiene cerchio, schermata, Elementi grafici, Carattere&#10;&#10;Descrizione generata automaticamente">
+            <a:extLst>
+              <a:ext uri="{FF2B5EF4-FFF2-40B4-BE49-F238E27FC236}">
+                <a16:creationId xmlns:a16="http://schemas.microsoft.com/office/drawing/2014/main" id="{6732222C-B1AF-E1AD-7075-5100C735BBC3}"/>
+              </a:ext>
+            </a:extLst>
+          </p:cNvPr>
+          <p:cNvPicPr>
+            <a:picLocks noChangeAspect="1"/>
+          </p:cNvPicPr>
+          <p:nvPr/>
+        </p:nvPicPr>
+        <p:blipFill>
+          <a:blip r:embed="rId3">
+            <a:extLst>
+              <a:ext uri="{28A0092B-C50C-407E-A947-70E740481C1C}">
+                <a14:useLocalDpi xmlns:a14="http://schemas.microsoft.com/office/drawing/2010/main" val="0"/>
+              </a:ext>
+            </a:extLst>
+          </a:blip>
+          <a:stretch>
+            <a:fillRect/>
+          </a:stretch>
+        </p:blipFill>
+        <p:spPr>
+          <a:xfrm>
+            <a:off x="1744550" y="2546449"/>
+            <a:ext cx="8702899" cy="4144893"/>
+          </a:xfrm>
+          <a:prstGeom prst="rect">
+            <a:avLst/>
+          </a:prstGeom>
+        </p:spPr>
+      </p:pic>
     </p:spTree>
     <p:extLst>
       <p:ext uri="{BB962C8B-B14F-4D97-AF65-F5344CB8AC3E}">
@@ -8469,7 +8404,23 @@
                   <a:srgbClr val="C7D5E0"/>
                 </a:solidFill>
               </a:rPr>
-              <a:t> F2P non e’ un </a:t>
+              <a:t> F2P </a:t>
+            </a:r>
+            <a:r>
+              <a:rPr lang="en-US" dirty="0">
+                <a:solidFill>
+                  <a:srgbClr val="66C0F4"/>
+                </a:solidFill>
+              </a:rPr>
+              <a:t>non e’ </a:t>
+            </a:r>
+            <a:r>
+              <a:rPr lang="en-US" dirty="0">
+                <a:solidFill>
+                  <a:srgbClr val="C7D5E0"/>
+                </a:solidFill>
+              </a:rPr>
+              <a:t>un </a:t>
             </a:r>
             <a:r>
               <a:rPr lang="en-US" dirty="0" err="1">
@@ -9581,7 +9532,7 @@
             <a:r>
               <a:rPr lang="en-US" sz="1500" dirty="0" err="1">
                 <a:solidFill>
-                  <a:srgbClr val="C7D5E0"/>
+                  <a:srgbClr val="66C0F4"/>
                 </a:solidFill>
               </a:rPr>
               <a:t>correlazione</a:t>
@@ -9793,12 +9744,28 @@
                   <a:srgbClr val="C7D5E0"/>
                 </a:solidFill>
               </a:rPr>
-              <a:t>, non e’ </a:t>
+              <a:t>, </a:t>
+            </a:r>
+            <a:r>
+              <a:rPr lang="en-US" sz="1500" dirty="0">
+                <a:solidFill>
+                  <a:srgbClr val="66C0F4"/>
+                </a:solidFill>
+              </a:rPr>
+              <a:t>non e’</a:t>
+            </a:r>
+            <a:r>
+              <a:rPr lang="en-US" sz="1500" dirty="0">
+                <a:solidFill>
+                  <a:srgbClr val="C7D5E0"/>
+                </a:solidFill>
+              </a:rPr>
+              <a:t> </a:t>
             </a:r>
             <a:r>
               <a:rPr lang="en-US" sz="1500" dirty="0" err="1">
                 <a:solidFill>
-                  <a:srgbClr val="C7D5E0"/>
+                  <a:srgbClr val="66C0F4"/>
                 </a:solidFill>
               </a:rPr>
               <a:t>sufficiente</a:t>
@@ -12446,7 +12413,7 @@
         </p:nvSpPr>
         <p:spPr>
           <a:xfrm>
-            <a:off x="2240273" y="1720840"/>
+            <a:off x="2240273" y="1582340"/>
             <a:ext cx="7711453" cy="3693319"/>
           </a:xfrm>
           <a:prstGeom prst="rect">
@@ -13596,7 +13563,23 @@
                   <a:srgbClr val="66C0F4"/>
                 </a:solidFill>
               </a:rPr>
-              <a:t>IndiceDiPositivita</a:t>
+              <a:t>Indice</a:t>
+            </a:r>
+            <a:r>
+              <a:rPr lang="en-US" sz="3200" b="1" dirty="0">
+                <a:solidFill>
+                  <a:srgbClr val="66C0F4"/>
+                </a:solidFill>
+              </a:rPr>
+              <a:t> di </a:t>
+            </a:r>
+            <a:r>
+              <a:rPr lang="en-US" sz="3200" b="1" dirty="0" err="1">
+                <a:solidFill>
+                  <a:srgbClr val="66C0F4"/>
+                </a:solidFill>
+              </a:rPr>
+              <a:t>Positivita</a:t>
             </a:r>
             <a:r>
               <a:rPr lang="en-US" sz="3200" b="1" dirty="0">
@@ -13864,8 +13847,8 @@
         </p:nvSpPr>
         <p:spPr>
           <a:xfrm>
-            <a:off x="2240273" y="1720840"/>
-            <a:ext cx="7711453" cy="3416320"/>
+            <a:off x="2617242" y="1679005"/>
+            <a:ext cx="6957515" cy="3416320"/>
           </a:xfrm>
           <a:prstGeom prst="rect">
             <a:avLst/>
@@ -15225,8 +15208,8 @@
         </p:nvSpPr>
         <p:spPr>
           <a:xfrm>
-            <a:off x="2515239" y="2217907"/>
-            <a:ext cx="6823313" cy="2585323"/>
+            <a:off x="2008548" y="1859339"/>
+            <a:ext cx="8174904" cy="3139321"/>
           </a:xfrm>
           <a:prstGeom prst="rect">
             <a:avLst/>
@@ -15273,27 +15256,145 @@
             </a:r>
             <a:r>
               <a:rPr lang="en-US" dirty="0" err="1"/>
+              <a:t>migliori</a:t>
+            </a:r>
+            <a:r>
+              <a:rPr lang="en-US" dirty="0"/>
+              <a:t> </a:t>
+            </a:r>
+            <a:r>
+              <a:rPr lang="en-US" dirty="0" err="1"/>
               <a:t>caratteristiche</a:t>
             </a:r>
             <a:r>
               <a:rPr lang="en-US" dirty="0"/>
-              <a:t> </a:t>
+              <a:t> per il </a:t>
+            </a:r>
+            <a:r>
+              <a:rPr lang="en-US" dirty="0" err="1">
+                <a:solidFill>
+                  <a:srgbClr val="66C0F4"/>
+                </a:solidFill>
+              </a:rPr>
+              <a:t>successo</a:t>
+            </a:r>
+            <a:r>
+              <a:rPr lang="en-US" dirty="0"/>
+              <a:t> di un </a:t>
             </a:r>
             <a:r>
               <a:rPr lang="en-US" dirty="0" err="1"/>
-              <a:t>migliori</a:t>
+              <a:t>videogioco</a:t>
             </a:r>
             <a:r>
               <a:rPr lang="en-US" dirty="0"/>
-              <a:t> per </a:t>
+              <a:t> </a:t>
             </a:r>
             <a:r>
               <a:rPr lang="en-US" dirty="0" err="1"/>
-              <a:t>calcolare</a:t>
+              <a:t>sono</a:t>
             </a:r>
             <a:r>
               <a:rPr lang="en-US" dirty="0"/>
-              <a:t> il </a:t>
+              <a:t> le </a:t>
+            </a:r>
+            <a:r>
+              <a:rPr lang="en-US" dirty="0" err="1"/>
+              <a:t>seguenti</a:t>
+            </a:r>
+            <a:r>
+              <a:rPr lang="en-US" dirty="0"/>
+              <a:t>:</a:t>
+            </a:r>
+          </a:p>
+          <a:p>
+            <a:pPr marL="285750" indent="-285750">
+              <a:buClr>
+                <a:srgbClr val="66C0F4"/>
+              </a:buClr>
+              <a:buFont typeface="Arial" panose="020B0604020202020204" pitchFamily="34" charset="0"/>
+              <a:buChar char="•"/>
+            </a:pPr>
+            <a:r>
+              <a:rPr lang="en-US" dirty="0" err="1"/>
+              <a:t>Genere</a:t>
+            </a:r>
+            <a:r>
+              <a:rPr lang="en-US" dirty="0"/>
+              <a:t>: </a:t>
+            </a:r>
+            <a:r>
+              <a:rPr lang="en-US" dirty="0">
+                <a:solidFill>
+                  <a:srgbClr val="66C0F4"/>
+                </a:solidFill>
+              </a:rPr>
+              <a:t>Action</a:t>
+            </a:r>
+            <a:r>
+              <a:rPr lang="en-US" dirty="0"/>
+              <a:t> (</a:t>
+            </a:r>
+            <a:r>
+              <a:rPr lang="en-US" dirty="0" err="1"/>
+              <a:t>Potenzialmente</a:t>
+            </a:r>
+            <a:r>
+              <a:rPr lang="en-US" dirty="0"/>
+              <a:t> </a:t>
+            </a:r>
+            <a:r>
+              <a:rPr lang="en-US" dirty="0">
+                <a:solidFill>
+                  <a:srgbClr val="66C0F4"/>
+                </a:solidFill>
+              </a:rPr>
+              <a:t>Action-Shooter</a:t>
+            </a:r>
+            <a:r>
+              <a:rPr lang="en-US" dirty="0"/>
+              <a:t>)</a:t>
+            </a:r>
+          </a:p>
+          <a:p>
+            <a:pPr marL="285750" indent="-285750">
+              <a:buClr>
+                <a:srgbClr val="66C0F4"/>
+              </a:buClr>
+              <a:buFont typeface="Arial" panose="020B0604020202020204" pitchFamily="34" charset="0"/>
+              <a:buChar char="•"/>
+            </a:pPr>
+            <a:r>
+              <a:rPr lang="en-US" dirty="0"/>
+              <a:t>Maggiore e’ l’ </a:t>
+            </a:r>
+            <a:r>
+              <a:rPr lang="en-US" dirty="0">
+                <a:solidFill>
+                  <a:srgbClr val="66C0F4"/>
+                </a:solidFill>
+              </a:rPr>
+              <a:t>I_P</a:t>
+            </a:r>
+            <a:r>
+              <a:rPr lang="en-US" dirty="0"/>
+              <a:t> </a:t>
+            </a:r>
+            <a:r>
+              <a:rPr lang="en-US" dirty="0" err="1"/>
+              <a:t>maggiore</a:t>
+            </a:r>
+            <a:r>
+              <a:rPr lang="en-US" dirty="0"/>
+              <a:t> e’ il </a:t>
+            </a:r>
+            <a:r>
+              <a:rPr lang="en-US" dirty="0" err="1"/>
+              <a:t>potenziale</a:t>
+            </a:r>
+            <a:r>
+              <a:rPr lang="en-US" dirty="0"/>
+              <a:t> </a:t>
             </a:r>
             <a:r>
               <a:rPr lang="en-US" dirty="0" err="1"/>
@@ -15301,11 +15402,32 @@
             </a:r>
             <a:r>
               <a:rPr lang="en-US" dirty="0"/>
-              <a:t> di  un </a:t>
+              <a:t> </a:t>
+            </a:r>
+          </a:p>
+          <a:p>
+            <a:pPr marL="285750" indent="-285750">
+              <a:buClr>
+                <a:srgbClr val="66C0F4"/>
+              </a:buClr>
+              <a:buFont typeface="Arial" panose="020B0604020202020204" pitchFamily="34" charset="0"/>
+              <a:buChar char="•"/>
+            </a:pPr>
+            <a:r>
+              <a:rPr lang="en-US" dirty="0">
+                <a:solidFill>
+                  <a:srgbClr val="66C0F4"/>
+                </a:solidFill>
+              </a:rPr>
+              <a:t>Free2Play</a:t>
+            </a:r>
+            <a:r>
+              <a:rPr lang="en-US" dirty="0"/>
+              <a:t> e’ un </a:t>
             </a:r>
             <a:r>
               <a:rPr lang="en-US" dirty="0" err="1"/>
-              <a:t>videogioco</a:t>
+              <a:t>modello</a:t>
             </a:r>
             <a:r>
               <a:rPr lang="en-US" dirty="0"/>
@@ -15313,20 +15435,9 @@
             </a:r>
             <a:r>
               <a:rPr lang="en-US" dirty="0" err="1"/>
-              <a:t>sono</a:t>
-            </a:r>
-            <a:r>
-              <a:rPr lang="en-US" dirty="0"/>
-              <a:t> le </a:t>
-            </a:r>
-            <a:r>
-              <a:rPr lang="en-US" dirty="0" err="1"/>
-              <a:t>seguenti</a:t>
-            </a:r>
-            <a:r>
-              <a:rPr lang="en-US" dirty="0"/>
-              <a:t>:</a:t>
-            </a:r>
+              <a:t>migliore</a:t>
+            </a:r>
+            <a:endParaRPr lang="en-US" dirty="0"/>
           </a:p>
           <a:p>
             <a:pPr marL="285750" indent="-285750">
@@ -15334,138 +15445,165 @@
               <a:buChar char="•"/>
             </a:pPr>
             <a:r>
+              <a:rPr lang="en-US" dirty="0">
+                <a:solidFill>
+                  <a:srgbClr val="66C0F4"/>
+                </a:solidFill>
+              </a:rPr>
+              <a:t>Multiplayer</a:t>
+            </a:r>
+            <a:r>
+              <a:rPr lang="en-US" dirty="0"/>
+              <a:t> e’ la </a:t>
+            </a:r>
+            <a:r>
               <a:rPr lang="en-US" dirty="0" err="1"/>
-              <a:t>Genere</a:t>
+              <a:t>caratteristica</a:t>
             </a:r>
             <a:r>
               <a:rPr lang="en-US" dirty="0"/>
-              <a:t>: Action (</a:t>
+              <a:t> </a:t>
             </a:r>
             <a:r>
               <a:rPr lang="en-US" dirty="0" err="1"/>
-              <a:t>Potenzialmente</a:t>
+              <a:t>migliore</a:t>
+            </a:r>
+            <a:endParaRPr lang="en-US" dirty="0"/>
+          </a:p>
+          <a:p>
+            <a:endParaRPr lang="en-US" dirty="0"/>
+          </a:p>
+          <a:p>
+            <a:r>
+              <a:rPr lang="en-US" dirty="0" err="1"/>
+              <a:t>L’indicatore</a:t>
             </a:r>
             <a:r>
               <a:rPr lang="en-US" dirty="0"/>
-              <a:t> Action-Shooter)</a:t>
+              <a:t> del </a:t>
+            </a:r>
+            <a:r>
+              <a:rPr lang="en-US" dirty="0" err="1"/>
+              <a:t>successo</a:t>
+            </a:r>
+            <a:r>
+              <a:rPr lang="en-US" dirty="0"/>
+              <a:t> </a:t>
+            </a:r>
+            <a:r>
+              <a:rPr lang="en-US" dirty="0" err="1"/>
+              <a:t>dei</a:t>
+            </a:r>
+            <a:r>
+              <a:rPr lang="en-US" dirty="0"/>
+              <a:t> F2P e’:</a:t>
             </a:r>
           </a:p>
           <a:p>
             <a:pPr marL="285750" indent="-285750">
+              <a:buClr>
+                <a:srgbClr val="66C0F4"/>
+              </a:buClr>
               <a:buFont typeface="Arial" panose="020B0604020202020204" pitchFamily="34" charset="0"/>
               <a:buChar char="•"/>
             </a:pPr>
             <a:r>
+              <a:rPr lang="en-US" dirty="0" err="1">
+                <a:solidFill>
+                  <a:srgbClr val="66C0F4"/>
+                </a:solidFill>
+              </a:rPr>
+              <a:t>Tempo_Medio</a:t>
+            </a:r>
+            <a:r>
+              <a:rPr lang="en-US" dirty="0">
+                <a:solidFill>
+                  <a:srgbClr val="66C0F4"/>
+                </a:solidFill>
+              </a:rPr>
+              <a:t> * #Download </a:t>
+            </a:r>
+            <a:r>
               <a:rPr lang="en-US" dirty="0"/>
-              <a:t>Maggiore e’ l’ I_P </a:t>
+              <a:t>come </a:t>
             </a:r>
             <a:r>
               <a:rPr lang="en-US" dirty="0" err="1"/>
-              <a:t>maggiore</a:t>
+              <a:t>indicatore</a:t>
             </a:r>
             <a:r>
               <a:rPr lang="en-US" dirty="0"/>
-              <a:t> e’ il </a:t>
-            </a:r>
-            <a:r>
-              <a:rPr lang="en-US" dirty="0" err="1"/>
-              <a:t>potenziale</a:t>
-            </a:r>
-            <a:r>
-              <a:rPr lang="en-US" dirty="0"/>
-              <a:t> </a:t>
+              <a:t> del </a:t>
             </a:r>
             <a:r>
               <a:rPr lang="en-US" dirty="0" err="1"/>
               <a:t>successo</a:t>
             </a:r>
+            <a:endParaRPr lang="en-US" dirty="0"/>
+          </a:p>
+          <a:p>
+            <a:r>
+              <a:rPr lang="en-US" dirty="0" err="1"/>
+              <a:t>Mentre</a:t>
+            </a:r>
             <a:r>
               <a:rPr lang="en-US" dirty="0"/>
               <a:t> </a:t>
             </a:r>
+            <a:r>
+              <a:rPr lang="en-US" dirty="0" err="1"/>
+              <a:t>quello</a:t>
+            </a:r>
+            <a:r>
+              <a:rPr lang="en-US" dirty="0"/>
+              <a:t> per </a:t>
+            </a:r>
+            <a:r>
+              <a:rPr lang="en-US" dirty="0" err="1"/>
+              <a:t>i</a:t>
+            </a:r>
+            <a:r>
+              <a:rPr lang="en-US" dirty="0"/>
+              <a:t> </a:t>
+            </a:r>
+            <a:r>
+              <a:rPr lang="en-US" dirty="0" err="1"/>
+              <a:t>videogiochi</a:t>
+            </a:r>
+            <a:r>
+              <a:rPr lang="en-US" dirty="0"/>
+              <a:t> a </a:t>
+            </a:r>
+            <a:r>
+              <a:rPr lang="en-US" dirty="0" err="1"/>
+              <a:t>pagamento</a:t>
+            </a:r>
+            <a:r>
+              <a:rPr lang="en-US" dirty="0"/>
+              <a:t> e’:</a:t>
+            </a:r>
           </a:p>
           <a:p>
             <a:pPr marL="285750" indent="-285750">
+              <a:buClr>
+                <a:srgbClr val="66C0F4"/>
+              </a:buClr>
               <a:buFont typeface="Arial" panose="020B0604020202020204" pitchFamily="34" charset="0"/>
               <a:buChar char="•"/>
             </a:pPr>
             <a:r>
-              <a:rPr lang="en-US" dirty="0"/>
-              <a:t>Free2Play e’ un </a:t>
-            </a:r>
-            <a:r>
-              <a:rPr lang="en-US" dirty="0" err="1"/>
-              <a:t>modello</a:t>
-            </a:r>
-            <a:r>
-              <a:rPr lang="en-US" dirty="0"/>
-              <a:t> </a:t>
-            </a:r>
-            <a:r>
-              <a:rPr lang="en-US" dirty="0" err="1"/>
-              <a:t>migliore</a:t>
-            </a:r>
-            <a:endParaRPr lang="en-US" dirty="0"/>
-          </a:p>
-          <a:p>
-            <a:pPr marL="285750" indent="-285750">
-              <a:buFont typeface="Arial" panose="020B0604020202020204" pitchFamily="34" charset="0"/>
-              <a:buChar char="•"/>
-            </a:pPr>
-            <a:r>
-              <a:rPr lang="en-US" dirty="0"/>
-              <a:t>Multiplayer e’ la </a:t>
-            </a:r>
-            <a:r>
-              <a:rPr lang="en-US" dirty="0" err="1"/>
-              <a:t>caratteristica</a:t>
-            </a:r>
-            <a:r>
-              <a:rPr lang="en-US" dirty="0"/>
-              <a:t> </a:t>
-            </a:r>
-            <a:r>
-              <a:rPr lang="en-US" dirty="0" err="1"/>
-              <a:t>migliore</a:t>
-            </a:r>
-            <a:endParaRPr lang="en-US" dirty="0"/>
-          </a:p>
-          <a:p>
-            <a:pPr marL="285750" indent="-285750">
-              <a:buFont typeface="Arial" panose="020B0604020202020204" pitchFamily="34" charset="0"/>
-              <a:buChar char="•"/>
-            </a:pPr>
-            <a:endParaRPr lang="en-US" dirty="0"/>
-          </a:p>
-          <a:p>
-            <a:pPr marL="285750" indent="-285750">
-              <a:buFont typeface="Arial" panose="020B0604020202020204" pitchFamily="34" charset="0"/>
-              <a:buChar char="•"/>
-            </a:pPr>
-            <a:r>
-              <a:rPr lang="en-US" dirty="0" err="1"/>
-              <a:t>Tempo_Medio</a:t>
-            </a:r>
-            <a:r>
-              <a:rPr lang="en-US" dirty="0"/>
-              <a:t> * #Download come </a:t>
-            </a:r>
-            <a:r>
-              <a:rPr lang="en-US" dirty="0" err="1"/>
-              <a:t>indicatore</a:t>
-            </a:r>
-            <a:r>
-              <a:rPr lang="en-US" dirty="0"/>
-              <a:t> del </a:t>
-            </a:r>
-            <a:r>
-              <a:rPr lang="en-US" dirty="0" err="1"/>
-              <a:t>successo</a:t>
-            </a:r>
-            <a:endParaRPr lang="en-US" dirty="0"/>
-          </a:p>
-          <a:p>
-            <a:endParaRPr lang="en-US" u="sng" dirty="0"/>
+              <a:rPr lang="en-US" dirty="0" err="1">
+                <a:solidFill>
+                  <a:srgbClr val="66C0F4"/>
+                </a:solidFill>
+              </a:rPr>
+              <a:t>Estimated_Owners</a:t>
+            </a:r>
+            <a:endParaRPr lang="en-US" dirty="0">
+              <a:solidFill>
+                <a:srgbClr val="66C0F4"/>
+              </a:solidFill>
+            </a:endParaRPr>
           </a:p>
         </p:txBody>
       </p:sp>
@@ -15840,52 +15978,12 @@
           <a:chExt cx="0" cy="0"/>
         </a:xfrm>
       </p:grpSpPr>
-      <p:sp>
-        <p:nvSpPr>
-          <p:cNvPr id="16" name="Titolo 15">
+      <p:pic>
+        <p:nvPicPr>
+          <p:cNvPr id="21" name="Immagine 20" descr="Immagine che contiene Elementi grafici, cerchio, clipart, cartone animato">
             <a:extLst>
               <a:ext uri="{FF2B5EF4-FFF2-40B4-BE49-F238E27FC236}">
-                <a16:creationId xmlns:a16="http://schemas.microsoft.com/office/drawing/2014/main" id="{F7263360-930D-9D6A-C2AC-5E06A3EFBC66}"/>
-              </a:ext>
-            </a:extLst>
-          </p:cNvPr>
-          <p:cNvSpPr>
-            <a:spLocks noGrp="1"/>
-          </p:cNvSpPr>
-          <p:nvPr>
-            <p:ph type="title"/>
-          </p:nvPr>
-        </p:nvSpPr>
-        <p:spPr>
-          <a:xfrm>
-            <a:off x="838200" y="159702"/>
-            <a:ext cx="10515600" cy="777875"/>
-          </a:xfrm>
-        </p:spPr>
-        <p:txBody>
-          <a:bodyPr>
-            <a:normAutofit/>
-          </a:bodyPr>
-          <a:lstStyle/>
-          <a:p>
-            <a:pPr algn="ctr"/>
-            <a:r>
-              <a:rPr lang="en-US" sz="3200" b="1" dirty="0">
-                <a:solidFill>
-                  <a:srgbClr val="66C0F4"/>
-                </a:solidFill>
-              </a:rPr>
-              <a:t>FIN</a:t>
-            </a:r>
-          </a:p>
-        </p:txBody>
-      </p:sp>
-      <p:pic>
-        <p:nvPicPr>
-          <p:cNvPr id="17" name="Immagine 16" descr="Immagine che contiene Elementi grafici, cerchio, clipart, cartone animato">
-            <a:extLst>
-              <a:ext uri="{FF2B5EF4-FFF2-40B4-BE49-F238E27FC236}">
-                <a16:creationId xmlns:a16="http://schemas.microsoft.com/office/drawing/2014/main" id="{05A5E460-1E13-E434-F2FF-8F2679A217ED}"/>
+                <a16:creationId xmlns:a16="http://schemas.microsoft.com/office/drawing/2014/main" id="{4FD06CF5-5AFE-49A5-C0F7-6786D03CE24C}"/>
               </a:ext>
             </a:extLst>
           </p:cNvPr>
@@ -15895,7 +15993,7 @@
           <p:nvPr/>
         </p:nvPicPr>
         <p:blipFill>
-          <a:blip r:embed="rId2">
+          <a:blip r:embed="rId3">
             <a:alphaModFix/>
             <a:extLst>
               <a:ext uri="{28A0092B-C50C-407E-A947-70E740481C1C}">
@@ -15909,8 +16007,8 @@
         </p:blipFill>
         <p:spPr>
           <a:xfrm>
-            <a:off x="11642903" y="0"/>
-            <a:ext cx="549097" cy="548640"/>
+            <a:off x="5885293" y="311838"/>
+            <a:ext cx="6055247" cy="6050201"/>
           </a:xfrm>
           <a:prstGeom prst="rect">
             <a:avLst/>
@@ -15929,10 +16027,199 @@
           </a:effectLst>
         </p:spPr>
       </p:pic>
+      <p:sp>
+        <p:nvSpPr>
+          <p:cNvPr id="37" name="CasellaDiTesto 36">
+            <a:extLst>
+              <a:ext uri="{FF2B5EF4-FFF2-40B4-BE49-F238E27FC236}">
+                <a16:creationId xmlns:a16="http://schemas.microsoft.com/office/drawing/2014/main" id="{3FE74F44-FEE8-34F0-35B4-E649B708E3E6}"/>
+              </a:ext>
+            </a:extLst>
+          </p:cNvPr>
+          <p:cNvSpPr txBox="1"/>
+          <p:nvPr/>
+        </p:nvSpPr>
+        <p:spPr>
+          <a:xfrm>
+            <a:off x="419100" y="5601590"/>
+            <a:ext cx="2629829" cy="646331"/>
+          </a:xfrm>
+          <a:prstGeom prst="rect">
+            <a:avLst/>
+          </a:prstGeom>
+          <a:noFill/>
+        </p:spPr>
+        <p:txBody>
+          <a:bodyPr wrap="square" rtlCol="0">
+            <a:spAutoFit/>
+          </a:bodyPr>
+          <a:lstStyle/>
+          <a:p>
+            <a:r>
+              <a:rPr lang="en-US">
+                <a:solidFill>
+                  <a:srgbClr val="C7D5E0"/>
+                </a:solidFill>
+                <a:latin typeface="+mj-lt"/>
+                <a:cs typeface="Arial" panose="020B0604020202020204" pitchFamily="34" charset="0"/>
+              </a:rPr>
+              <a:t>Ivan Selvaggio 975982</a:t>
+            </a:r>
+          </a:p>
+          <a:p>
+            <a:r>
+              <a:rPr lang="en-US">
+                <a:solidFill>
+                  <a:srgbClr val="C7D5E0"/>
+                </a:solidFill>
+                <a:latin typeface="+mj-lt"/>
+                <a:cs typeface="Arial" panose="020B0604020202020204" pitchFamily="34" charset="0"/>
+              </a:rPr>
+              <a:t>Marco Morandi 966631</a:t>
+            </a:r>
+            <a:endParaRPr lang="en-US" dirty="0">
+              <a:solidFill>
+                <a:srgbClr val="C7D5E0"/>
+              </a:solidFill>
+              <a:latin typeface="+mj-lt"/>
+              <a:cs typeface="Arial" panose="020B0604020202020204" pitchFamily="34" charset="0"/>
+            </a:endParaRPr>
+          </a:p>
+        </p:txBody>
+      </p:sp>
+      <p:sp>
+        <p:nvSpPr>
+          <p:cNvPr id="38" name="CasellaDiTesto 37">
+            <a:extLst>
+              <a:ext uri="{FF2B5EF4-FFF2-40B4-BE49-F238E27FC236}">
+                <a16:creationId xmlns:a16="http://schemas.microsoft.com/office/drawing/2014/main" id="{1F39DBC7-9FBF-F56D-6D5D-BE9B9E50AB75}"/>
+              </a:ext>
+            </a:extLst>
+          </p:cNvPr>
+          <p:cNvSpPr txBox="1"/>
+          <p:nvPr/>
+        </p:nvSpPr>
+        <p:spPr>
+          <a:xfrm>
+            <a:off x="419100" y="1459502"/>
+            <a:ext cx="3527632" cy="523220"/>
+          </a:xfrm>
+          <a:prstGeom prst="rect">
+            <a:avLst/>
+          </a:prstGeom>
+          <a:noFill/>
+        </p:spPr>
+        <p:txBody>
+          <a:bodyPr wrap="none" rtlCol="0">
+            <a:spAutoFit/>
+          </a:bodyPr>
+          <a:lstStyle/>
+          <a:p>
+            <a:r>
+              <a:rPr lang="en-US" sz="2800" dirty="0" err="1">
+                <a:solidFill>
+                  <a:srgbClr val="C7D5E0"/>
+                </a:solidFill>
+                <a:latin typeface="+mj-lt"/>
+                <a:cs typeface="Arial" panose="020B0604020202020204" pitchFamily="34" charset="0"/>
+              </a:rPr>
+              <a:t>Grazie</a:t>
+            </a:r>
+            <a:r>
+              <a:rPr lang="en-US" sz="2800" dirty="0">
+                <a:solidFill>
+                  <a:srgbClr val="C7D5E0"/>
+                </a:solidFill>
+                <a:latin typeface="+mj-lt"/>
+                <a:cs typeface="Arial" panose="020B0604020202020204" pitchFamily="34" charset="0"/>
+              </a:rPr>
+              <a:t> per </a:t>
+            </a:r>
+            <a:r>
+              <a:rPr lang="en-US" sz="2800" dirty="0" err="1">
+                <a:solidFill>
+                  <a:srgbClr val="C7D5E0"/>
+                </a:solidFill>
+                <a:latin typeface="+mj-lt"/>
+                <a:cs typeface="Arial" panose="020B0604020202020204" pitchFamily="34" charset="0"/>
+              </a:rPr>
+              <a:t>l’attenzione</a:t>
+            </a:r>
+            <a:r>
+              <a:rPr lang="en-US" sz="2800" dirty="0">
+                <a:solidFill>
+                  <a:srgbClr val="C7D5E0"/>
+                </a:solidFill>
+                <a:latin typeface="+mj-lt"/>
+                <a:cs typeface="Arial" panose="020B0604020202020204" pitchFamily="34" charset="0"/>
+              </a:rPr>
+              <a:t>!</a:t>
+            </a:r>
+          </a:p>
+        </p:txBody>
+      </p:sp>
+      <p:pic>
+        <p:nvPicPr>
+          <p:cNvPr id="3" name="Immagine 2">
+            <a:extLst>
+              <a:ext uri="{FF2B5EF4-FFF2-40B4-BE49-F238E27FC236}">
+                <a16:creationId xmlns:a16="http://schemas.microsoft.com/office/drawing/2014/main" id="{3C0670D5-2520-9770-F705-7D01C3CE8E11}"/>
+              </a:ext>
+            </a:extLst>
+          </p:cNvPr>
+          <p:cNvPicPr>
+            <a:picLocks noChangeAspect="1"/>
+          </p:cNvPicPr>
+          <p:nvPr/>
+        </p:nvPicPr>
+        <p:blipFill>
+          <a:blip r:embed="rId4"/>
+          <a:stretch>
+            <a:fillRect/>
+          </a:stretch>
+        </p:blipFill>
+        <p:spPr>
+          <a:xfrm>
+            <a:off x="419100" y="2186554"/>
+            <a:ext cx="3983880" cy="1150384"/>
+          </a:xfrm>
+          <a:prstGeom prst="rect">
+            <a:avLst/>
+          </a:prstGeom>
+        </p:spPr>
+      </p:pic>
+      <p:sp>
+        <p:nvSpPr>
+          <p:cNvPr id="2" name="Titolo 1">
+            <a:extLst>
+              <a:ext uri="{FF2B5EF4-FFF2-40B4-BE49-F238E27FC236}">
+                <a16:creationId xmlns:a16="http://schemas.microsoft.com/office/drawing/2014/main" id="{3BE1E256-B1C3-0C20-A952-85FB0BBBB396}"/>
+              </a:ext>
+            </a:extLst>
+          </p:cNvPr>
+          <p:cNvSpPr>
+            <a:spLocks noGrp="1"/>
+          </p:cNvSpPr>
+          <p:nvPr>
+            <p:ph type="title"/>
+          </p:nvPr>
+        </p:nvSpPr>
+        <p:spPr/>
+        <p:txBody>
+          <a:bodyPr/>
+          <a:lstStyle/>
+          <a:p>
+            <a:r>
+              <a:rPr lang="en-US" dirty="0"/>
+              <a:t>End</a:t>
+            </a:r>
+          </a:p>
+        </p:txBody>
+      </p:sp>
     </p:spTree>
     <p:extLst>
       <p:ext uri="{BB962C8B-B14F-4D97-AF65-F5344CB8AC3E}">
-        <p14:creationId xmlns:p14="http://schemas.microsoft.com/office/powerpoint/2010/main" val="2005865351"/>
+        <p14:creationId xmlns:p14="http://schemas.microsoft.com/office/powerpoint/2010/main" val="2337058424"/>
       </p:ext>
     </p:extLst>
   </p:cSld>
@@ -16071,7 +16358,7 @@
         </p:nvSpPr>
         <p:spPr>
           <a:xfrm>
-            <a:off x="2107660" y="3612204"/>
+            <a:off x="3810954" y="2889051"/>
             <a:ext cx="6233758" cy="646331"/>
           </a:xfrm>
           <a:prstGeom prst="rect">
@@ -16265,8 +16552,8 @@
         </p:nvSpPr>
         <p:spPr>
           <a:xfrm>
-            <a:off x="838200" y="2717816"/>
-            <a:ext cx="4351986" cy="1422365"/>
+            <a:off x="931058" y="2717817"/>
+            <a:ext cx="5164942" cy="1422365"/>
           </a:xfrm>
           <a:prstGeom prst="rect">
             <a:avLst/>
@@ -16751,7 +17038,7 @@
           </p:cNvPicPr>
           <p:nvPr/>
         </p:nvPicPr>
-        <p:blipFill>
+        <p:blipFill rotWithShape="1">
           <a:blip r:embed="rId3">
             <a:extLst>
               <a:ext uri="{28A0092B-C50C-407E-A947-70E740481C1C}">
@@ -16759,14 +17046,48 @@
               </a:ext>
             </a:extLst>
           </a:blip>
-          <a:stretch>
-            <a:fillRect/>
-          </a:stretch>
+          <a:srcRect l="25335" t="-1003" r="26085" b="1173"/>
+          <a:stretch/>
         </p:blipFill>
         <p:spPr>
           <a:xfrm>
-            <a:off x="3253975" y="1270820"/>
-            <a:ext cx="8663476" cy="4316359"/>
+            <a:off x="6908957" y="1459283"/>
+            <a:ext cx="4208746" cy="4308952"/>
+          </a:xfrm>
+          <a:prstGeom prst="rect">
+            <a:avLst/>
+          </a:prstGeom>
+        </p:spPr>
+      </p:pic>
+      <p:pic>
+        <p:nvPicPr>
+          <p:cNvPr id="3" name="Immagine 2" descr="Immagine che contiene cerchio, schermata, astronomia&#10;&#10;Descrizione generata automaticamente">
+            <a:extLst>
+              <a:ext uri="{FF2B5EF4-FFF2-40B4-BE49-F238E27FC236}">
+                <a16:creationId xmlns:a16="http://schemas.microsoft.com/office/drawing/2014/main" id="{2775876A-2ED8-E38C-E710-67F1EEDE4FFC}"/>
+              </a:ext>
+            </a:extLst>
+          </p:cNvPr>
+          <p:cNvPicPr>
+            <a:picLocks noChangeAspect="1"/>
+          </p:cNvPicPr>
+          <p:nvPr/>
+        </p:nvPicPr>
+        <p:blipFill rotWithShape="1">
+          <a:blip r:embed="rId3">
+            <a:extLst>
+              <a:ext uri="{28A0092B-C50C-407E-A947-70E740481C1C}">
+                <a14:useLocalDpi xmlns:a14="http://schemas.microsoft.com/office/drawing/2010/main" val="0"/>
+              </a:ext>
+            </a:extLst>
+          </a:blip>
+          <a:srcRect l="81441" t="-399" r="-208" b="66477"/>
+          <a:stretch/>
+        </p:blipFill>
+        <p:spPr>
+          <a:xfrm>
+            <a:off x="6096000" y="1459282"/>
+            <a:ext cx="1836024" cy="1653435"/>
           </a:xfrm>
           <a:prstGeom prst="rect">
             <a:avLst/>
@@ -18061,4 +18382,299 @@
     </a:ext>
   </a:extLst>
 </a:theme>
+</file>
+
+<file path=ppt/theme/theme2.xml><?xml version="1.0" encoding="utf-8"?>
+<a:theme xmlns:a="http://schemas.openxmlformats.org/drawingml/2006/main" name="Tema di Office">
+  <a:themeElements>
+    <a:clrScheme name="Office">
+      <a:dk1>
+        <a:sysClr val="windowText" lastClr="000000"/>
+      </a:dk1>
+      <a:lt1>
+        <a:sysClr val="window" lastClr="FFFFFF"/>
+      </a:lt1>
+      <a:dk2>
+        <a:srgbClr val="44546A"/>
+      </a:dk2>
+      <a:lt2>
+        <a:srgbClr val="E7E6E6"/>
+      </a:lt2>
+      <a:accent1>
+        <a:srgbClr val="4472C4"/>
+      </a:accent1>
+      <a:accent2>
+        <a:srgbClr val="ED7D31"/>
+      </a:accent2>
+      <a:accent3>
+        <a:srgbClr val="A5A5A5"/>
+      </a:accent3>
+      <a:accent4>
+        <a:srgbClr val="FFC000"/>
+      </a:accent4>
+      <a:accent5>
+        <a:srgbClr val="5B9BD5"/>
+      </a:accent5>
+      <a:accent6>
+        <a:srgbClr val="70AD47"/>
+      </a:accent6>
+      <a:hlink>
+        <a:srgbClr val="0563C1"/>
+      </a:hlink>
+      <a:folHlink>
+        <a:srgbClr val="954F72"/>
+      </a:folHlink>
+    </a:clrScheme>
+    <a:fontScheme name="Office">
+      <a:majorFont>
+        <a:latin typeface="Calibri Light" panose="020F0302020204030204"/>
+        <a:ea typeface=""/>
+        <a:cs typeface=""/>
+        <a:font script="Jpan" typeface="游ゴシック Light"/>
+        <a:font script="Hang" typeface="맑은 고딕"/>
+        <a:font script="Hans" typeface="等线 Light"/>
+        <a:font script="Hant" typeface="新細明體"/>
+        <a:font script="Arab" typeface="Times New Roman"/>
+        <a:font script="Hebr" typeface="Times New Roman"/>
+        <a:font script="Thai" typeface="Angsana New"/>
+        <a:font script="Ethi" typeface="Nyala"/>
+        <a:font script="Beng" typeface="Vrinda"/>
+        <a:font script="Gujr" typeface="Shruti"/>
+        <a:font script="Khmr" typeface="MoolBoran"/>
+        <a:font script="Knda" typeface="Tunga"/>
+        <a:font script="Guru" typeface="Raavi"/>
+        <a:font script="Cans" typeface="Euphemia"/>
+        <a:font script="Cher" typeface="Plantagenet Cherokee"/>
+        <a:font script="Yiii" typeface="Microsoft Yi Baiti"/>
+        <a:font script="Tibt" typeface="Microsoft Himalaya"/>
+        <a:font script="Thaa" typeface="MV Boli"/>
+        <a:font script="Deva" typeface="Mangal"/>
+        <a:font script="Telu" typeface="Gautami"/>
+        <a:font script="Taml" typeface="Latha"/>
+        <a:font script="Syrc" typeface="Estrangelo Edessa"/>
+        <a:font script="Orya" typeface="Kalinga"/>
+        <a:font script="Mlym" typeface="Kartika"/>
+        <a:font script="Laoo" typeface="DokChampa"/>
+        <a:font script="Sinh" typeface="Iskoola Pota"/>
+        <a:font script="Mong" typeface="Mongolian Baiti"/>
+        <a:font script="Viet" typeface="Times New Roman"/>
+        <a:font script="Uigh" typeface="Microsoft Uighur"/>
+        <a:font script="Geor" typeface="Sylfaen"/>
+        <a:font script="Armn" typeface="Arial"/>
+        <a:font script="Bugi" typeface="Leelawadee UI"/>
+        <a:font script="Bopo" typeface="Microsoft JhengHei"/>
+        <a:font script="Java" typeface="Javanese Text"/>
+        <a:font script="Lisu" typeface="Segoe UI"/>
+        <a:font script="Mymr" typeface="Myanmar Text"/>
+        <a:font script="Nkoo" typeface="Ebrima"/>
+        <a:font script="Olck" typeface="Nirmala UI"/>
+        <a:font script="Osma" typeface="Ebrima"/>
+        <a:font script="Phag" typeface="Phagspa"/>
+        <a:font script="Syrn" typeface="Estrangelo Edessa"/>
+        <a:font script="Syrj" typeface="Estrangelo Edessa"/>
+        <a:font script="Syre" typeface="Estrangelo Edessa"/>
+        <a:font script="Sora" typeface="Nirmala UI"/>
+        <a:font script="Tale" typeface="Microsoft Tai Le"/>
+        <a:font script="Talu" typeface="Microsoft New Tai Lue"/>
+        <a:font script="Tfng" typeface="Ebrima"/>
+      </a:majorFont>
+      <a:minorFont>
+        <a:latin typeface="Calibri" panose="020F0502020204030204"/>
+        <a:ea typeface=""/>
+        <a:cs typeface=""/>
+        <a:font script="Jpan" typeface="游ゴシック"/>
+        <a:font script="Hang" typeface="맑은 고딕"/>
+        <a:font script="Hans" typeface="等线"/>
+        <a:font script="Hant" typeface="新細明體"/>
+        <a:font script="Arab" typeface="Arial"/>
+        <a:font script="Hebr" typeface="Arial"/>
+        <a:font script="Thai" typeface="Cordia New"/>
+        <a:font script="Ethi" typeface="Nyala"/>
+        <a:font script="Beng" typeface="Vrinda"/>
+        <a:font script="Gujr" typeface="Shruti"/>
+        <a:font script="Khmr" typeface="DaunPenh"/>
+        <a:font script="Knda" typeface="Tunga"/>
+        <a:font script="Guru" typeface="Raavi"/>
+        <a:font script="Cans" typeface="Euphemia"/>
+        <a:font script="Cher" typeface="Plantagenet Cherokee"/>
+        <a:font script="Yiii" typeface="Microsoft Yi Baiti"/>
+        <a:font script="Tibt" typeface="Microsoft Himalaya"/>
+        <a:font script="Thaa" typeface="MV Boli"/>
+        <a:font script="Deva" typeface="Mangal"/>
+        <a:font script="Telu" typeface="Gautami"/>
+        <a:font script="Taml" typeface="Latha"/>
+        <a:font script="Syrc" typeface="Estrangelo Edessa"/>
+        <a:font script="Orya" typeface="Kalinga"/>
+        <a:font script="Mlym" typeface="Kartika"/>
+        <a:font script="Laoo" typeface="DokChampa"/>
+        <a:font script="Sinh" typeface="Iskoola Pota"/>
+        <a:font script="Mong" typeface="Mongolian Baiti"/>
+        <a:font script="Viet" typeface="Arial"/>
+        <a:font script="Uigh" typeface="Microsoft Uighur"/>
+        <a:font script="Geor" typeface="Sylfaen"/>
+        <a:font script="Armn" typeface="Arial"/>
+        <a:font script="Bugi" typeface="Leelawadee UI"/>
+        <a:font script="Bopo" typeface="Microsoft JhengHei"/>
+        <a:font script="Java" typeface="Javanese Text"/>
+        <a:font script="Lisu" typeface="Segoe UI"/>
+        <a:font script="Mymr" typeface="Myanmar Text"/>
+        <a:font script="Nkoo" typeface="Ebrima"/>
+        <a:font script="Olck" typeface="Nirmala UI"/>
+        <a:font script="Osma" typeface="Ebrima"/>
+        <a:font script="Phag" typeface="Phagspa"/>
+        <a:font script="Syrn" typeface="Estrangelo Edessa"/>
+        <a:font script="Syrj" typeface="Estrangelo Edessa"/>
+        <a:font script="Syre" typeface="Estrangelo Edessa"/>
+        <a:font script="Sora" typeface="Nirmala UI"/>
+        <a:font script="Tale" typeface="Microsoft Tai Le"/>
+        <a:font script="Talu" typeface="Microsoft New Tai Lue"/>
+        <a:font script="Tfng" typeface="Ebrima"/>
+      </a:minorFont>
+    </a:fontScheme>
+    <a:fmtScheme name="Office">
+      <a:fillStyleLst>
+        <a:solidFill>
+          <a:schemeClr val="phClr"/>
+        </a:solidFill>
+        <a:gradFill rotWithShape="1">
+          <a:gsLst>
+            <a:gs pos="0">
+              <a:schemeClr val="phClr">
+                <a:lumMod val="110000"/>
+                <a:satMod val="105000"/>
+                <a:tint val="67000"/>
+              </a:schemeClr>
+            </a:gs>
+            <a:gs pos="50000">
+              <a:schemeClr val="phClr">
+                <a:lumMod val="105000"/>
+                <a:satMod val="103000"/>
+                <a:tint val="73000"/>
+              </a:schemeClr>
+            </a:gs>
+            <a:gs pos="100000">
+              <a:schemeClr val="phClr">
+                <a:lumMod val="105000"/>
+                <a:satMod val="109000"/>
+                <a:tint val="81000"/>
+              </a:schemeClr>
+            </a:gs>
+          </a:gsLst>
+          <a:lin ang="5400000" scaled="0"/>
+        </a:gradFill>
+        <a:gradFill rotWithShape="1">
+          <a:gsLst>
+            <a:gs pos="0">
+              <a:schemeClr val="phClr">
+                <a:satMod val="103000"/>
+                <a:lumMod val="102000"/>
+                <a:tint val="94000"/>
+              </a:schemeClr>
+            </a:gs>
+            <a:gs pos="50000">
+              <a:schemeClr val="phClr">
+                <a:satMod val="110000"/>
+                <a:lumMod val="100000"/>
+                <a:shade val="100000"/>
+              </a:schemeClr>
+            </a:gs>
+            <a:gs pos="100000">
+              <a:schemeClr val="phClr">
+                <a:lumMod val="99000"/>
+                <a:satMod val="120000"/>
+                <a:shade val="78000"/>
+              </a:schemeClr>
+            </a:gs>
+          </a:gsLst>
+          <a:lin ang="5400000" scaled="0"/>
+        </a:gradFill>
+      </a:fillStyleLst>
+      <a:lnStyleLst>
+        <a:ln w="6350" cap="flat" cmpd="sng" algn="ctr">
+          <a:solidFill>
+            <a:schemeClr val="phClr"/>
+          </a:solidFill>
+          <a:prstDash val="solid"/>
+          <a:miter lim="800000"/>
+        </a:ln>
+        <a:ln w="12700" cap="flat" cmpd="sng" algn="ctr">
+          <a:solidFill>
+            <a:schemeClr val="phClr"/>
+          </a:solidFill>
+          <a:prstDash val="solid"/>
+          <a:miter lim="800000"/>
+        </a:ln>
+        <a:ln w="19050" cap="flat" cmpd="sng" algn="ctr">
+          <a:solidFill>
+            <a:schemeClr val="phClr"/>
+          </a:solidFill>
+          <a:prstDash val="solid"/>
+          <a:miter lim="800000"/>
+        </a:ln>
+      </a:lnStyleLst>
+      <a:effectStyleLst>
+        <a:effectStyle>
+          <a:effectLst/>
+        </a:effectStyle>
+        <a:effectStyle>
+          <a:effectLst/>
+        </a:effectStyle>
+        <a:effectStyle>
+          <a:effectLst>
+            <a:outerShdw blurRad="57150" dist="19050" dir="5400000" algn="ctr" rotWithShape="0">
+              <a:srgbClr val="000000">
+                <a:alpha val="63000"/>
+              </a:srgbClr>
+            </a:outerShdw>
+          </a:effectLst>
+        </a:effectStyle>
+      </a:effectStyleLst>
+      <a:bgFillStyleLst>
+        <a:solidFill>
+          <a:schemeClr val="phClr"/>
+        </a:solidFill>
+        <a:solidFill>
+          <a:schemeClr val="phClr">
+            <a:tint val="95000"/>
+            <a:satMod val="170000"/>
+          </a:schemeClr>
+        </a:solidFill>
+        <a:gradFill rotWithShape="1">
+          <a:gsLst>
+            <a:gs pos="0">
+              <a:schemeClr val="phClr">
+                <a:tint val="93000"/>
+                <a:satMod val="150000"/>
+                <a:shade val="98000"/>
+                <a:lumMod val="102000"/>
+              </a:schemeClr>
+            </a:gs>
+            <a:gs pos="50000">
+              <a:schemeClr val="phClr">
+                <a:tint val="98000"/>
+                <a:satMod val="130000"/>
+                <a:shade val="90000"/>
+                <a:lumMod val="103000"/>
+              </a:schemeClr>
+            </a:gs>
+            <a:gs pos="100000">
+              <a:schemeClr val="phClr">
+                <a:shade val="63000"/>
+                <a:satMod val="120000"/>
+              </a:schemeClr>
+            </a:gs>
+          </a:gsLst>
+          <a:lin ang="5400000" scaled="0"/>
+        </a:gradFill>
+      </a:bgFillStyleLst>
+    </a:fmtScheme>
+  </a:themeElements>
+  <a:objectDefaults/>
+  <a:extraClrSchemeLst/>
+  <a:extLst>
+    <a:ext uri="{05A4C25C-085E-4340-85A3-A5531E510DB2}">
+      <thm15:themeFamily xmlns:thm15="http://schemas.microsoft.com/office/thememl/2012/main" name="Office Theme" id="{62F939B6-93AF-4DB8-9C6B-D6C7DFDC589F}" vid="{4A3C46E8-61CC-4603-A589-7422A47A8E4A}"/>
+    </a:ext>
+  </a:extLst>
+</a:theme>
 </file>
</xml_diff>

<commit_message>
Fixed presentazione bug titolo
</commit_message>
<xml_diff>
--- a/Steam.pptx
+++ b/Steam.pptx
@@ -225,7 +225,7 @@
           <a:p>
             <a:fld id="{7022550D-5032-4B1A-B8F2-136CEE1C1CE7}" type="datetimeFigureOut">
               <a:rPr lang="en-US" smtClean="0"/>
-              <a:t>7/7/2023</a:t>
+              <a:t>7/8/2023</a:t>
             </a:fld>
             <a:endParaRPr lang="en-US"/>
           </a:p>
@@ -708,7 +708,7 @@
           <a:p>
             <a:fld id="{6014689B-0DCE-4194-8205-09B15DFDD564}" type="datetimeFigureOut">
               <a:rPr lang="en-US" smtClean="0"/>
-              <a:t>7/7/2023</a:t>
+              <a:t>7/8/2023</a:t>
             </a:fld>
             <a:endParaRPr lang="en-US"/>
           </a:p>
@@ -878,7 +878,7 @@
           <a:p>
             <a:fld id="{6014689B-0DCE-4194-8205-09B15DFDD564}" type="datetimeFigureOut">
               <a:rPr lang="en-US" smtClean="0"/>
-              <a:t>7/7/2023</a:t>
+              <a:t>7/8/2023</a:t>
             </a:fld>
             <a:endParaRPr lang="en-US"/>
           </a:p>
@@ -1058,7 +1058,7 @@
           <a:p>
             <a:fld id="{6014689B-0DCE-4194-8205-09B15DFDD564}" type="datetimeFigureOut">
               <a:rPr lang="en-US" smtClean="0"/>
-              <a:t>7/7/2023</a:t>
+              <a:t>7/8/2023</a:t>
             </a:fld>
             <a:endParaRPr lang="en-US"/>
           </a:p>
@@ -1228,7 +1228,7 @@
           <a:p>
             <a:fld id="{6014689B-0DCE-4194-8205-09B15DFDD564}" type="datetimeFigureOut">
               <a:rPr lang="en-US" smtClean="0"/>
-              <a:t>7/7/2023</a:t>
+              <a:t>7/8/2023</a:t>
             </a:fld>
             <a:endParaRPr lang="en-US"/>
           </a:p>
@@ -1474,7 +1474,7 @@
           <a:p>
             <a:fld id="{6014689B-0DCE-4194-8205-09B15DFDD564}" type="datetimeFigureOut">
               <a:rPr lang="en-US" smtClean="0"/>
-              <a:t>7/7/2023</a:t>
+              <a:t>7/8/2023</a:t>
             </a:fld>
             <a:endParaRPr lang="en-US"/>
           </a:p>
@@ -1706,7 +1706,7 @@
           <a:p>
             <a:fld id="{6014689B-0DCE-4194-8205-09B15DFDD564}" type="datetimeFigureOut">
               <a:rPr lang="en-US" smtClean="0"/>
-              <a:t>7/7/2023</a:t>
+              <a:t>7/8/2023</a:t>
             </a:fld>
             <a:endParaRPr lang="en-US"/>
           </a:p>
@@ -2073,7 +2073,7 @@
           <a:p>
             <a:fld id="{6014689B-0DCE-4194-8205-09B15DFDD564}" type="datetimeFigureOut">
               <a:rPr lang="en-US" smtClean="0"/>
-              <a:t>7/7/2023</a:t>
+              <a:t>7/8/2023</a:t>
             </a:fld>
             <a:endParaRPr lang="en-US"/>
           </a:p>
@@ -2191,7 +2191,7 @@
           <a:p>
             <a:fld id="{6014689B-0DCE-4194-8205-09B15DFDD564}" type="datetimeFigureOut">
               <a:rPr lang="en-US" smtClean="0"/>
-              <a:t>7/7/2023</a:t>
+              <a:t>7/8/2023</a:t>
             </a:fld>
             <a:endParaRPr lang="en-US"/>
           </a:p>
@@ -2286,7 +2286,7 @@
           <a:p>
             <a:fld id="{6014689B-0DCE-4194-8205-09B15DFDD564}" type="datetimeFigureOut">
               <a:rPr lang="en-US" smtClean="0"/>
-              <a:t>7/7/2023</a:t>
+              <a:t>7/8/2023</a:t>
             </a:fld>
             <a:endParaRPr lang="en-US"/>
           </a:p>
@@ -2563,7 +2563,7 @@
           <a:p>
             <a:fld id="{6014689B-0DCE-4194-8205-09B15DFDD564}" type="datetimeFigureOut">
               <a:rPr lang="en-US" smtClean="0"/>
-              <a:t>7/7/2023</a:t>
+              <a:t>7/8/2023</a:t>
             </a:fld>
             <a:endParaRPr lang="en-US"/>
           </a:p>
@@ -2820,7 +2820,7 @@
           <a:p>
             <a:fld id="{6014689B-0DCE-4194-8205-09B15DFDD564}" type="datetimeFigureOut">
               <a:rPr lang="en-US" smtClean="0"/>
-              <a:t>7/7/2023</a:t>
+              <a:t>7/8/2023</a:t>
             </a:fld>
             <a:endParaRPr lang="en-US"/>
           </a:p>
@@ -3033,7 +3033,7 @@
           <a:p>
             <a:fld id="{6014689B-0DCE-4194-8205-09B15DFDD564}" type="datetimeFigureOut">
               <a:rPr lang="en-US" smtClean="0"/>
-              <a:t>7/7/2023</a:t>
+              <a:t>7/8/2023</a:t>
             </a:fld>
             <a:endParaRPr lang="en-US"/>
           </a:p>
@@ -3798,34 +3798,6 @@
           </a:p>
         </p:txBody>
       </p:sp>
-      <p:sp>
-        <p:nvSpPr>
-          <p:cNvPr id="2" name="Titolo 1">
-            <a:extLst>
-              <a:ext uri="{FF2B5EF4-FFF2-40B4-BE49-F238E27FC236}">
-                <a16:creationId xmlns:a16="http://schemas.microsoft.com/office/drawing/2014/main" id="{F6C43D43-162B-4698-E03A-91A1B24E9CA6}"/>
-              </a:ext>
-            </a:extLst>
-          </p:cNvPr>
-          <p:cNvSpPr>
-            <a:spLocks noGrp="1"/>
-          </p:cNvSpPr>
-          <p:nvPr>
-            <p:ph type="title"/>
-          </p:nvPr>
-        </p:nvSpPr>
-        <p:spPr/>
-        <p:txBody>
-          <a:bodyPr/>
-          <a:lstStyle/>
-          <a:p>
-            <a:r>
-              <a:rPr lang="en-US" dirty="0"/>
-              <a:t>Start</a:t>
-            </a:r>
-          </a:p>
-        </p:txBody>
-      </p:sp>
     </p:spTree>
     <p:extLst>
       <p:ext uri="{BB962C8B-B14F-4D97-AF65-F5344CB8AC3E}">
@@ -16188,34 +16160,6 @@
           </a:prstGeom>
         </p:spPr>
       </p:pic>
-      <p:sp>
-        <p:nvSpPr>
-          <p:cNvPr id="2" name="Titolo 1">
-            <a:extLst>
-              <a:ext uri="{FF2B5EF4-FFF2-40B4-BE49-F238E27FC236}">
-                <a16:creationId xmlns:a16="http://schemas.microsoft.com/office/drawing/2014/main" id="{3BE1E256-B1C3-0C20-A952-85FB0BBBB396}"/>
-              </a:ext>
-            </a:extLst>
-          </p:cNvPr>
-          <p:cNvSpPr>
-            <a:spLocks noGrp="1"/>
-          </p:cNvSpPr>
-          <p:nvPr>
-            <p:ph type="title"/>
-          </p:nvPr>
-        </p:nvSpPr>
-        <p:spPr/>
-        <p:txBody>
-          <a:bodyPr/>
-          <a:lstStyle/>
-          <a:p>
-            <a:r>
-              <a:rPr lang="en-US" dirty="0"/>
-              <a:t>End</a:t>
-            </a:r>
-          </a:p>
-        </p:txBody>
-      </p:sp>
     </p:spTree>
     <p:extLst>
       <p:ext uri="{BB962C8B-B14F-4D97-AF65-F5344CB8AC3E}">

</xml_diff>

<commit_message>
Fixed bug in graph
</commit_message>
<xml_diff>
--- a/Steam.pptx
+++ b/Steam.pptx
@@ -8716,12 +8716,20 @@
           <a:p>
             <a:pPr algn="ctr"/>
             <a:r>
+              <a:rPr lang="it-IT" sz="3200" b="1" dirty="0">
+                <a:solidFill>
+                  <a:srgbClr val="66C0F4"/>
+                </a:solidFill>
+              </a:rPr>
+              <a:t>Distribuzione</a:t>
+            </a:r>
+            <a:r>
               <a:rPr lang="en-US" sz="3200" b="1" dirty="0">
                 <a:solidFill>
                   <a:srgbClr val="66C0F4"/>
                 </a:solidFill>
               </a:rPr>
-              <a:t>Distribuzione percentuale Single/Multi/Coop secondo gli indici</a:t>
+              <a:t> (%) Single/Multi/Coop</a:t>
             </a:r>
           </a:p>
         </p:txBody>
@@ -8777,10 +8785,10 @@
       </p:pic>
       <p:pic>
         <p:nvPicPr>
-          <p:cNvPr id="15" name="Immagine 14" descr="Immagine che contiene schermata, Policromia, testo, Rettangolo&#10;&#10;Descrizione generata automaticamente">
+          <p:cNvPr id="3" name="Immagine 2" descr="Immagine che contiene schermata, Policromia, Rettangolo, testo&#10;&#10;Descrizione generata automaticamente">
             <a:extLst>
               <a:ext uri="{FF2B5EF4-FFF2-40B4-BE49-F238E27FC236}">
-                <a16:creationId xmlns:a16="http://schemas.microsoft.com/office/drawing/2014/main" id="{A567A78D-A2F2-F6FA-530D-98F40B660A57}"/>
+                <a16:creationId xmlns:a16="http://schemas.microsoft.com/office/drawing/2014/main" id="{BBBC8700-C57A-0DC2-FF32-C51A4E8FB5A0}"/>
               </a:ext>
             </a:extLst>
           </p:cNvPr>
@@ -8791,6 +8799,7 @@
         </p:nvPicPr>
         <p:blipFill>
           <a:blip r:embed="rId4">
+            <a:alphaModFix/>
             <a:extLst>
               <a:ext uri="{28A0092B-C50C-407E-A947-70E740481C1C}">
                 <a14:useLocalDpi xmlns:a14="http://schemas.microsoft.com/office/drawing/2010/main" val="0"/>
@@ -8803,8 +8812,43 @@
         </p:blipFill>
         <p:spPr>
           <a:xfrm>
-            <a:off x="1061830" y="1133096"/>
-            <a:ext cx="10068339" cy="5139048"/>
+            <a:off x="1261234" y="937577"/>
+            <a:ext cx="9669531" cy="5439111"/>
+          </a:xfrm>
+          <a:prstGeom prst="rect">
+            <a:avLst/>
+          </a:prstGeom>
+        </p:spPr>
+      </p:pic>
+      <p:pic>
+        <p:nvPicPr>
+          <p:cNvPr id="15" name="Immagine 14" descr="Immagine che contiene schermata, Policromia, testo, Rettangolo&#10;&#10;Descrizione generata automaticamente">
+            <a:extLst>
+              <a:ext uri="{FF2B5EF4-FFF2-40B4-BE49-F238E27FC236}">
+                <a16:creationId xmlns:a16="http://schemas.microsoft.com/office/drawing/2014/main" id="{A567A78D-A2F2-F6FA-530D-98F40B660A57}"/>
+              </a:ext>
+            </a:extLst>
+          </p:cNvPr>
+          <p:cNvPicPr>
+            <a:picLocks noChangeAspect="1"/>
+          </p:cNvPicPr>
+          <p:nvPr/>
+        </p:nvPicPr>
+        <p:blipFill rotWithShape="1">
+          <a:blip r:embed="rId5">
+            <a:extLst>
+              <a:ext uri="{28A0092B-C50C-407E-A947-70E740481C1C}">
+                <a14:useLocalDpi xmlns:a14="http://schemas.microsoft.com/office/drawing/2010/main" val="0"/>
+              </a:ext>
+            </a:extLst>
+          </a:blip>
+          <a:srcRect l="93793" b="82424"/>
+          <a:stretch/>
+        </p:blipFill>
+        <p:spPr>
+          <a:xfrm>
+            <a:off x="9661756" y="937577"/>
+            <a:ext cx="1269009" cy="1834198"/>
           </a:xfrm>
           <a:prstGeom prst="rect">
             <a:avLst/>

</xml_diff>

<commit_message>
Fixed typo in graph
</commit_message>
<xml_diff>
--- a/Steam.pptx
+++ b/Steam.pptx
@@ -4492,10 +4492,10 @@
       </p:sp>
       <p:pic>
         <p:nvPicPr>
-          <p:cNvPr id="11" name="Immagine 10" descr="Immagine che contiene testo, cerchio, schermata, Policromia&#10;&#10;Descrizione generata automaticamente">
+          <p:cNvPr id="3" name="Immagine 2" descr="Immagine che contiene testo, cerchio, schermata, Elementi grafici&#10;&#10;Descrizione generata automaticamente">
             <a:extLst>
               <a:ext uri="{FF2B5EF4-FFF2-40B4-BE49-F238E27FC236}">
-                <a16:creationId xmlns:a16="http://schemas.microsoft.com/office/drawing/2014/main" id="{3FD6F79F-300C-6BB5-229A-D1616D9A88D9}"/>
+                <a16:creationId xmlns:a16="http://schemas.microsoft.com/office/drawing/2014/main" id="{785893BB-7661-C550-25E7-C21E3E05600A}"/>
               </a:ext>
             </a:extLst>
           </p:cNvPr>
@@ -4518,8 +4518,8 @@
         </p:blipFill>
         <p:spPr>
           <a:xfrm>
-            <a:off x="5869969" y="650816"/>
-            <a:ext cx="6047482" cy="6047482"/>
+            <a:off x="5826413" y="520755"/>
+            <a:ext cx="5816490" cy="5816490"/>
           </a:xfrm>
           <a:prstGeom prst="rect">
             <a:avLst/>

</xml_diff>